<commit_message>
more details in chem dosing
</commit_message>
<xml_diff>
--- a/Technical_Report/Tech Report Figures.pptx
+++ b/Technical_Report/Tech Report Figures.pptx
@@ -5,11 +5,13 @@
     <p:sldMasterId id="2147483648" r:id="rId1"/>
   </p:sldMasterIdLst>
   <p:notesMasterIdLst>
-    <p:notesMasterId r:id="rId4"/>
+    <p:notesMasterId r:id="rId6"/>
   </p:notesMasterIdLst>
   <p:sldIdLst>
     <p:sldId id="798" r:id="rId2"/>
     <p:sldId id="799" r:id="rId3"/>
+    <p:sldId id="800" r:id="rId4"/>
+    <p:sldId id="801" r:id="rId5"/>
   </p:sldIdLst>
   <p:sldSz cx="12192000" cy="6858000"/>
   <p:notesSz cx="6858000" cy="9144000"/>
@@ -4062,10 +4064,502 @@
       </p:grpSpPr>
       <p:pic>
         <p:nvPicPr>
-          <p:cNvPr id="6" name="Picture 5">
-            <a:extLst>
-              <a:ext uri="{FF2B5EF4-FFF2-40B4-BE49-F238E27FC236}">
-                <a16:creationId xmlns:a16="http://schemas.microsoft.com/office/drawing/2014/main" id="{D7D96701-2092-4447-95EB-5C626431178E}"/>
+          <p:cNvPr id="7" name="Picture 6">
+            <a:extLst>
+              <a:ext uri="{FF2B5EF4-FFF2-40B4-BE49-F238E27FC236}">
+                <a16:creationId xmlns:a16="http://schemas.microsoft.com/office/drawing/2014/main" id="{3938211D-DACE-448F-A3BD-77AEBF5F7810}"/>
+              </a:ext>
+            </a:extLst>
+          </p:cNvPr>
+          <p:cNvPicPr>
+            <a:picLocks noChangeAspect="1"/>
+          </p:cNvPicPr>
+          <p:nvPr/>
+        </p:nvPicPr>
+        <p:blipFill>
+          <a:blip r:embed="rId2"/>
+          <a:stretch>
+            <a:fillRect/>
+          </a:stretch>
+        </p:blipFill>
+        <p:spPr>
+          <a:xfrm>
+            <a:off x="3914153" y="0"/>
+            <a:ext cx="2296718" cy="6858000"/>
+          </a:xfrm>
+          <a:prstGeom prst="rect">
+            <a:avLst/>
+          </a:prstGeom>
+        </p:spPr>
+      </p:pic>
+      <p:sp>
+        <p:nvSpPr>
+          <p:cNvPr id="2" name="TextBox 1">
+            <a:extLst>
+              <a:ext uri="{FF2B5EF4-FFF2-40B4-BE49-F238E27FC236}">
+                <a16:creationId xmlns:a16="http://schemas.microsoft.com/office/drawing/2014/main" id="{02780D60-EAD9-49DE-960B-ECE3B9B4E370}"/>
+              </a:ext>
+            </a:extLst>
+          </p:cNvPr>
+          <p:cNvSpPr txBox="1"/>
+          <p:nvPr/>
+        </p:nvSpPr>
+        <p:spPr>
+          <a:xfrm>
+            <a:off x="6536787" y="385785"/>
+            <a:ext cx="317716" cy="369332"/>
+          </a:xfrm>
+          <a:prstGeom prst="rect">
+            <a:avLst/>
+          </a:prstGeom>
+          <a:noFill/>
+        </p:spPr>
+        <p:txBody>
+          <a:bodyPr wrap="none" rtlCol="0">
+            <a:spAutoFit/>
+          </a:bodyPr>
+          <a:lstStyle/>
+          <a:p>
+            <a:r>
+              <a:rPr lang="en-US" dirty="0"/>
+              <a:t>A</a:t>
+            </a:r>
+          </a:p>
+        </p:txBody>
+      </p:sp>
+      <p:cxnSp>
+        <p:nvCxnSpPr>
+          <p:cNvPr id="4" name="Straight Arrow Connector 3">
+            <a:extLst>
+              <a:ext uri="{FF2B5EF4-FFF2-40B4-BE49-F238E27FC236}">
+                <a16:creationId xmlns:a16="http://schemas.microsoft.com/office/drawing/2014/main" id="{C07D5880-4019-4C56-95E7-FA3783811039}"/>
+              </a:ext>
+            </a:extLst>
+          </p:cNvPr>
+          <p:cNvCxnSpPr>
+            <a:cxnSpLocks/>
+          </p:cNvCxnSpPr>
+          <p:nvPr/>
+        </p:nvCxnSpPr>
+        <p:spPr>
+          <a:xfrm flipH="1">
+            <a:off x="5335421" y="570451"/>
+            <a:ext cx="1090546" cy="1"/>
+          </a:xfrm>
+          <a:prstGeom prst="straightConnector1">
+            <a:avLst/>
+          </a:prstGeom>
+          <a:ln w="28575">
+            <a:solidFill>
+              <a:schemeClr val="tx1"/>
+            </a:solidFill>
+            <a:tailEnd type="triangle"/>
+          </a:ln>
+          <a:effectLst>
+            <a:glow rad="38100">
+              <a:schemeClr val="bg1"/>
+            </a:glow>
+          </a:effectLst>
+        </p:spPr>
+        <p:style>
+          <a:lnRef idx="1">
+            <a:schemeClr val="accent1"/>
+          </a:lnRef>
+          <a:fillRef idx="0">
+            <a:schemeClr val="accent1"/>
+          </a:fillRef>
+          <a:effectRef idx="0">
+            <a:schemeClr val="accent1"/>
+          </a:effectRef>
+          <a:fontRef idx="minor">
+            <a:schemeClr val="tx1"/>
+          </a:fontRef>
+        </p:style>
+      </p:cxnSp>
+      <p:pic>
+        <p:nvPicPr>
+          <p:cNvPr id="10" name="Picture 9">
+            <a:extLst>
+              <a:ext uri="{FF2B5EF4-FFF2-40B4-BE49-F238E27FC236}">
+                <a16:creationId xmlns:a16="http://schemas.microsoft.com/office/drawing/2014/main" id="{85A4C6D6-98CD-4A87-BCD7-8CBE33813E20}"/>
+              </a:ext>
+            </a:extLst>
+          </p:cNvPr>
+          <p:cNvPicPr>
+            <a:picLocks noChangeAspect="1"/>
+          </p:cNvPicPr>
+          <p:nvPr/>
+        </p:nvPicPr>
+        <p:blipFill>
+          <a:blip r:embed="rId3"/>
+          <a:stretch>
+            <a:fillRect/>
+          </a:stretch>
+        </p:blipFill>
+        <p:spPr>
+          <a:xfrm>
+            <a:off x="7075424" y="0"/>
+            <a:ext cx="2167904" cy="6858000"/>
+          </a:xfrm>
+          <a:prstGeom prst="rect">
+            <a:avLst/>
+          </a:prstGeom>
+        </p:spPr>
+      </p:pic>
+      <p:cxnSp>
+        <p:nvCxnSpPr>
+          <p:cNvPr id="13" name="Straight Arrow Connector 12">
+            <a:extLst>
+              <a:ext uri="{FF2B5EF4-FFF2-40B4-BE49-F238E27FC236}">
+                <a16:creationId xmlns:a16="http://schemas.microsoft.com/office/drawing/2014/main" id="{2E4A77FD-AB59-4C50-AABA-BCDF9D351454}"/>
+              </a:ext>
+            </a:extLst>
+          </p:cNvPr>
+          <p:cNvCxnSpPr>
+            <a:cxnSpLocks/>
+          </p:cNvCxnSpPr>
+          <p:nvPr/>
+        </p:nvCxnSpPr>
+        <p:spPr>
+          <a:xfrm flipH="1">
+            <a:off x="6016329" y="3365384"/>
+            <a:ext cx="409638" cy="0"/>
+          </a:xfrm>
+          <a:prstGeom prst="straightConnector1">
+            <a:avLst/>
+          </a:prstGeom>
+          <a:ln w="28575">
+            <a:solidFill>
+              <a:schemeClr val="tx1"/>
+            </a:solidFill>
+            <a:tailEnd type="triangle"/>
+          </a:ln>
+          <a:effectLst>
+            <a:glow rad="38100">
+              <a:schemeClr val="bg1"/>
+            </a:glow>
+          </a:effectLst>
+        </p:spPr>
+        <p:style>
+          <a:lnRef idx="1">
+            <a:schemeClr val="accent1"/>
+          </a:lnRef>
+          <a:fillRef idx="0">
+            <a:schemeClr val="accent1"/>
+          </a:fillRef>
+          <a:effectRef idx="0">
+            <a:schemeClr val="accent1"/>
+          </a:effectRef>
+          <a:fontRef idx="minor">
+            <a:schemeClr val="tx1"/>
+          </a:fontRef>
+        </p:style>
+      </p:cxnSp>
+      <p:cxnSp>
+        <p:nvCxnSpPr>
+          <p:cNvPr id="15" name="Straight Arrow Connector 14">
+            <a:extLst>
+              <a:ext uri="{FF2B5EF4-FFF2-40B4-BE49-F238E27FC236}">
+                <a16:creationId xmlns:a16="http://schemas.microsoft.com/office/drawing/2014/main" id="{46C12358-4C20-4AC7-8F04-F52AA9DCDD48}"/>
+              </a:ext>
+            </a:extLst>
+          </p:cNvPr>
+          <p:cNvCxnSpPr>
+            <a:cxnSpLocks/>
+          </p:cNvCxnSpPr>
+          <p:nvPr/>
+        </p:nvCxnSpPr>
+        <p:spPr>
+          <a:xfrm flipH="1">
+            <a:off x="5575542" y="4566409"/>
+            <a:ext cx="850425" cy="0"/>
+          </a:xfrm>
+          <a:prstGeom prst="straightConnector1">
+            <a:avLst/>
+          </a:prstGeom>
+          <a:ln w="28575">
+            <a:solidFill>
+              <a:schemeClr val="tx1"/>
+            </a:solidFill>
+            <a:tailEnd type="triangle"/>
+          </a:ln>
+          <a:effectLst>
+            <a:glow rad="38100">
+              <a:schemeClr val="bg1"/>
+            </a:glow>
+          </a:effectLst>
+        </p:spPr>
+        <p:style>
+          <a:lnRef idx="1">
+            <a:schemeClr val="accent1"/>
+          </a:lnRef>
+          <a:fillRef idx="0">
+            <a:schemeClr val="accent1"/>
+          </a:fillRef>
+          <a:effectRef idx="0">
+            <a:schemeClr val="accent1"/>
+          </a:effectRef>
+          <a:fontRef idx="minor">
+            <a:schemeClr val="tx1"/>
+          </a:fontRef>
+        </p:style>
+      </p:cxnSp>
+      <p:sp>
+        <p:nvSpPr>
+          <p:cNvPr id="21" name="TextBox 20">
+            <a:extLst>
+              <a:ext uri="{FF2B5EF4-FFF2-40B4-BE49-F238E27FC236}">
+                <a16:creationId xmlns:a16="http://schemas.microsoft.com/office/drawing/2014/main" id="{35997CFF-9B53-46F4-A1F2-0850AA08A023}"/>
+              </a:ext>
+            </a:extLst>
+          </p:cNvPr>
+          <p:cNvSpPr txBox="1"/>
+          <p:nvPr/>
+        </p:nvSpPr>
+        <p:spPr>
+          <a:xfrm>
+            <a:off x="6452364" y="3180718"/>
+            <a:ext cx="317716" cy="369332"/>
+          </a:xfrm>
+          <a:prstGeom prst="rect">
+            <a:avLst/>
+          </a:prstGeom>
+          <a:noFill/>
+        </p:spPr>
+        <p:txBody>
+          <a:bodyPr wrap="none" rtlCol="0">
+            <a:spAutoFit/>
+          </a:bodyPr>
+          <a:lstStyle/>
+          <a:p>
+            <a:r>
+              <a:rPr lang="en-US" dirty="0"/>
+              <a:t>B</a:t>
+            </a:r>
+          </a:p>
+        </p:txBody>
+      </p:sp>
+      <p:sp>
+        <p:nvSpPr>
+          <p:cNvPr id="22" name="TextBox 21">
+            <a:extLst>
+              <a:ext uri="{FF2B5EF4-FFF2-40B4-BE49-F238E27FC236}">
+                <a16:creationId xmlns:a16="http://schemas.microsoft.com/office/drawing/2014/main" id="{D224E52C-2F10-4DBA-9A7C-2A4FE6B30E35}"/>
+              </a:ext>
+            </a:extLst>
+          </p:cNvPr>
+          <p:cNvSpPr txBox="1"/>
+          <p:nvPr/>
+        </p:nvSpPr>
+        <p:spPr>
+          <a:xfrm>
+            <a:off x="6425967" y="4381743"/>
+            <a:ext cx="308098" cy="369332"/>
+          </a:xfrm>
+          <a:prstGeom prst="rect">
+            <a:avLst/>
+          </a:prstGeom>
+          <a:noFill/>
+        </p:spPr>
+        <p:txBody>
+          <a:bodyPr wrap="none" rtlCol="0">
+            <a:spAutoFit/>
+          </a:bodyPr>
+          <a:lstStyle/>
+          <a:p>
+            <a:r>
+              <a:rPr lang="en-US" dirty="0"/>
+              <a:t>C</a:t>
+            </a:r>
+          </a:p>
+        </p:txBody>
+      </p:sp>
+      <p:cxnSp>
+        <p:nvCxnSpPr>
+          <p:cNvPr id="23" name="Straight Arrow Connector 22">
+            <a:extLst>
+              <a:ext uri="{FF2B5EF4-FFF2-40B4-BE49-F238E27FC236}">
+                <a16:creationId xmlns:a16="http://schemas.microsoft.com/office/drawing/2014/main" id="{AB58D1BB-07E3-4B0C-A748-9A29412E2D43}"/>
+              </a:ext>
+            </a:extLst>
+          </p:cNvPr>
+          <p:cNvCxnSpPr>
+            <a:cxnSpLocks/>
+            <a:stCxn id="21" idx="3"/>
+          </p:cNvCxnSpPr>
+          <p:nvPr/>
+        </p:nvCxnSpPr>
+        <p:spPr>
+          <a:xfrm>
+            <a:off x="6770080" y="3365384"/>
+            <a:ext cx="410896" cy="0"/>
+          </a:xfrm>
+          <a:prstGeom prst="straightConnector1">
+            <a:avLst/>
+          </a:prstGeom>
+          <a:ln w="28575">
+            <a:solidFill>
+              <a:schemeClr val="tx1"/>
+            </a:solidFill>
+            <a:tailEnd type="triangle"/>
+          </a:ln>
+          <a:effectLst>
+            <a:glow rad="38100">
+              <a:schemeClr val="bg1"/>
+            </a:glow>
+          </a:effectLst>
+        </p:spPr>
+        <p:style>
+          <a:lnRef idx="1">
+            <a:schemeClr val="accent1"/>
+          </a:lnRef>
+          <a:fillRef idx="0">
+            <a:schemeClr val="accent1"/>
+          </a:fillRef>
+          <a:effectRef idx="0">
+            <a:schemeClr val="accent1"/>
+          </a:effectRef>
+          <a:fontRef idx="minor">
+            <a:schemeClr val="tx1"/>
+          </a:fontRef>
+        </p:style>
+      </p:cxnSp>
+      <p:cxnSp>
+        <p:nvCxnSpPr>
+          <p:cNvPr id="26" name="Straight Arrow Connector 25">
+            <a:extLst>
+              <a:ext uri="{FF2B5EF4-FFF2-40B4-BE49-F238E27FC236}">
+                <a16:creationId xmlns:a16="http://schemas.microsoft.com/office/drawing/2014/main" id="{513BC30C-2564-4AD0-8636-C7BB314C805D}"/>
+              </a:ext>
+            </a:extLst>
+          </p:cNvPr>
+          <p:cNvCxnSpPr>
+            <a:cxnSpLocks/>
+            <a:stCxn id="22" idx="3"/>
+          </p:cNvCxnSpPr>
+          <p:nvPr/>
+        </p:nvCxnSpPr>
+        <p:spPr>
+          <a:xfrm flipV="1">
+            <a:off x="6734065" y="4381743"/>
+            <a:ext cx="975418" cy="184666"/>
+          </a:xfrm>
+          <a:prstGeom prst="straightConnector1">
+            <a:avLst/>
+          </a:prstGeom>
+          <a:ln w="28575">
+            <a:solidFill>
+              <a:schemeClr val="tx1"/>
+            </a:solidFill>
+            <a:tailEnd type="triangle"/>
+          </a:ln>
+          <a:effectLst>
+            <a:glow rad="38100">
+              <a:schemeClr val="bg1"/>
+            </a:glow>
+          </a:effectLst>
+        </p:spPr>
+        <p:style>
+          <a:lnRef idx="1">
+            <a:schemeClr val="accent1"/>
+          </a:lnRef>
+          <a:fillRef idx="0">
+            <a:schemeClr val="accent1"/>
+          </a:fillRef>
+          <a:effectRef idx="0">
+            <a:schemeClr val="accent1"/>
+          </a:effectRef>
+          <a:fontRef idx="minor">
+            <a:schemeClr val="tx1"/>
+          </a:fontRef>
+        </p:style>
+      </p:cxnSp>
+      <p:cxnSp>
+        <p:nvCxnSpPr>
+          <p:cNvPr id="31" name="Straight Arrow Connector 30">
+            <a:extLst>
+              <a:ext uri="{FF2B5EF4-FFF2-40B4-BE49-F238E27FC236}">
+                <a16:creationId xmlns:a16="http://schemas.microsoft.com/office/drawing/2014/main" id="{79833C59-48D6-4D49-9D01-FB049340C29B}"/>
+              </a:ext>
+            </a:extLst>
+          </p:cNvPr>
+          <p:cNvCxnSpPr>
+            <a:cxnSpLocks/>
+            <a:stCxn id="2" idx="3"/>
+          </p:cNvCxnSpPr>
+          <p:nvPr/>
+        </p:nvCxnSpPr>
+        <p:spPr>
+          <a:xfrm>
+            <a:off x="6854503" y="570451"/>
+            <a:ext cx="1089871" cy="276998"/>
+          </a:xfrm>
+          <a:prstGeom prst="straightConnector1">
+            <a:avLst/>
+          </a:prstGeom>
+          <a:ln w="28575">
+            <a:solidFill>
+              <a:schemeClr val="tx1"/>
+            </a:solidFill>
+            <a:tailEnd type="triangle"/>
+          </a:ln>
+          <a:effectLst>
+            <a:glow rad="38100">
+              <a:schemeClr val="bg1"/>
+            </a:glow>
+          </a:effectLst>
+        </p:spPr>
+        <p:style>
+          <a:lnRef idx="1">
+            <a:schemeClr val="accent1"/>
+          </a:lnRef>
+          <a:fillRef idx="0">
+            <a:schemeClr val="accent1"/>
+          </a:fillRef>
+          <a:effectRef idx="0">
+            <a:schemeClr val="accent1"/>
+          </a:effectRef>
+          <a:fontRef idx="minor">
+            <a:schemeClr val="tx1"/>
+          </a:fontRef>
+        </p:style>
+      </p:cxnSp>
+    </p:spTree>
+    <p:extLst>
+      <p:ext uri="{BB962C8B-B14F-4D97-AF65-F5344CB8AC3E}">
+        <p14:creationId xmlns:p14="http://schemas.microsoft.com/office/powerpoint/2010/main" val="161018379"/>
+      </p:ext>
+    </p:extLst>
+  </p:cSld>
+  <p:clrMapOvr>
+    <a:masterClrMapping/>
+  </p:clrMapOvr>
+</p:sld>
+</file>
+
+<file path=ppt/slides/slide3.xml><?xml version="1.0" encoding="utf-8"?>
+<p:sld xmlns:a="http://schemas.openxmlformats.org/drawingml/2006/main" xmlns:r="http://schemas.openxmlformats.org/officeDocument/2006/relationships" xmlns:p="http://schemas.openxmlformats.org/presentationml/2006/main">
+  <p:cSld>
+    <p:spTree>
+      <p:nvGrpSpPr>
+        <p:cNvPr id="1" name=""/>
+        <p:cNvGrpSpPr/>
+        <p:nvPr/>
+      </p:nvGrpSpPr>
+      <p:grpSpPr>
+        <a:xfrm>
+          <a:off x="0" y="0"/>
+          <a:ext cx="0" cy="0"/>
+          <a:chOff x="0" y="0"/>
+          <a:chExt cx="0" cy="0"/>
+        </a:xfrm>
+      </p:grpSpPr>
+      <p:pic>
+        <p:nvPicPr>
+          <p:cNvPr id="2" name="Picture 1">
+            <a:extLst>
+              <a:ext uri="{FF2B5EF4-FFF2-40B4-BE49-F238E27FC236}">
+                <a16:creationId xmlns:a16="http://schemas.microsoft.com/office/drawing/2014/main" id="{C3EABD91-0E68-467B-9C99-BD9AEE916024}"/>
               </a:ext>
             </a:extLst>
           </p:cNvPr>
@@ -4075,32 +4569,1077 @@
           <p:nvPr/>
         </p:nvPicPr>
         <p:blipFill rotWithShape="1">
-          <a:blip r:embed="rId2">
-            <a:extLst>
-              <a:ext uri="{28A0092B-C50C-407E-A947-70E740481C1C}">
-                <a14:useLocalDpi xmlns:a14="http://schemas.microsoft.com/office/drawing/2010/main" val="0"/>
-              </a:ext>
-            </a:extLst>
-          </a:blip>
-          <a:srcRect l="34026" t="10746" r="27733"/>
+          <a:blip r:embed="rId2"/>
+          <a:srcRect l="1697"/>
           <a:stretch/>
         </p:blipFill>
         <p:spPr>
           <a:xfrm>
-            <a:off x="3922542" y="165194"/>
-            <a:ext cx="2238233" cy="6759918"/>
+            <a:off x="4278385" y="0"/>
+            <a:ext cx="3699090" cy="6858000"/>
           </a:xfrm>
           <a:prstGeom prst="rect">
             <a:avLst/>
           </a:prstGeom>
         </p:spPr>
       </p:pic>
+      <p:sp>
+        <p:nvSpPr>
+          <p:cNvPr id="3" name="TextBox 2">
+            <a:extLst>
+              <a:ext uri="{FF2B5EF4-FFF2-40B4-BE49-F238E27FC236}">
+                <a16:creationId xmlns:a16="http://schemas.microsoft.com/office/drawing/2014/main" id="{AE1033EA-1A3B-45DD-9F88-EF7639FA326D}"/>
+              </a:ext>
+            </a:extLst>
+          </p:cNvPr>
+          <p:cNvSpPr txBox="1"/>
+          <p:nvPr/>
+        </p:nvSpPr>
+        <p:spPr>
+          <a:xfrm>
+            <a:off x="3481938" y="2038417"/>
+            <a:ext cx="296876" cy="369332"/>
+          </a:xfrm>
+          <a:prstGeom prst="rect">
+            <a:avLst/>
+          </a:prstGeom>
+          <a:noFill/>
+        </p:spPr>
+        <p:txBody>
+          <a:bodyPr wrap="none" rtlCol="0">
+            <a:spAutoFit/>
+          </a:bodyPr>
+          <a:lstStyle/>
+          <a:p>
+            <a:pPr algn="ctr"/>
+            <a:r>
+              <a:rPr lang="en-US" dirty="0"/>
+              <a:t>E</a:t>
+            </a:r>
+          </a:p>
+        </p:txBody>
+      </p:sp>
+      <p:cxnSp>
+        <p:nvCxnSpPr>
+          <p:cNvPr id="4" name="Straight Arrow Connector 3">
+            <a:extLst>
+              <a:ext uri="{FF2B5EF4-FFF2-40B4-BE49-F238E27FC236}">
+                <a16:creationId xmlns:a16="http://schemas.microsoft.com/office/drawing/2014/main" id="{3CB0BBF5-CFF7-4BAE-B6E8-2382638B4A14}"/>
+              </a:ext>
+            </a:extLst>
+          </p:cNvPr>
+          <p:cNvCxnSpPr>
+            <a:cxnSpLocks/>
+          </p:cNvCxnSpPr>
+          <p:nvPr/>
+        </p:nvCxnSpPr>
+        <p:spPr>
+          <a:xfrm flipV="1">
+            <a:off x="3775742" y="1954635"/>
+            <a:ext cx="1953939" cy="705108"/>
+          </a:xfrm>
+          <a:prstGeom prst="straightConnector1">
+            <a:avLst/>
+          </a:prstGeom>
+          <a:ln w="28575">
+            <a:solidFill>
+              <a:schemeClr val="tx1"/>
+            </a:solidFill>
+            <a:tailEnd type="triangle"/>
+          </a:ln>
+          <a:effectLst>
+            <a:glow rad="38100">
+              <a:schemeClr val="bg1"/>
+            </a:glow>
+          </a:effectLst>
+        </p:spPr>
+        <p:style>
+          <a:lnRef idx="1">
+            <a:schemeClr val="accent1"/>
+          </a:lnRef>
+          <a:fillRef idx="0">
+            <a:schemeClr val="accent1"/>
+          </a:fillRef>
+          <a:effectRef idx="0">
+            <a:schemeClr val="accent1"/>
+          </a:effectRef>
+          <a:fontRef idx="minor">
+            <a:schemeClr val="tx1"/>
+          </a:fontRef>
+        </p:style>
+      </p:cxnSp>
+      <p:cxnSp>
+        <p:nvCxnSpPr>
+          <p:cNvPr id="8" name="Straight Arrow Connector 7">
+            <a:extLst>
+              <a:ext uri="{FF2B5EF4-FFF2-40B4-BE49-F238E27FC236}">
+                <a16:creationId xmlns:a16="http://schemas.microsoft.com/office/drawing/2014/main" id="{1E6585D6-D8ED-4A46-A975-2965BC2B982F}"/>
+              </a:ext>
+            </a:extLst>
+          </p:cNvPr>
+          <p:cNvCxnSpPr>
+            <a:cxnSpLocks/>
+          </p:cNvCxnSpPr>
+          <p:nvPr/>
+        </p:nvCxnSpPr>
+        <p:spPr>
+          <a:xfrm>
+            <a:off x="3775744" y="758558"/>
+            <a:ext cx="1695277" cy="325021"/>
+          </a:xfrm>
+          <a:prstGeom prst="straightConnector1">
+            <a:avLst/>
+          </a:prstGeom>
+          <a:ln w="28575">
+            <a:solidFill>
+              <a:schemeClr val="tx1"/>
+            </a:solidFill>
+            <a:tailEnd type="triangle"/>
+          </a:ln>
+          <a:effectLst>
+            <a:glow rad="38100">
+              <a:schemeClr val="bg1"/>
+            </a:glow>
+          </a:effectLst>
+        </p:spPr>
+        <p:style>
+          <a:lnRef idx="1">
+            <a:schemeClr val="accent1"/>
+          </a:lnRef>
+          <a:fillRef idx="0">
+            <a:schemeClr val="accent1"/>
+          </a:fillRef>
+          <a:effectRef idx="0">
+            <a:schemeClr val="accent1"/>
+          </a:effectRef>
+          <a:fontRef idx="minor">
+            <a:schemeClr val="tx1"/>
+          </a:fontRef>
+        </p:style>
+      </p:cxnSp>
+      <p:cxnSp>
+        <p:nvCxnSpPr>
+          <p:cNvPr id="13" name="Straight Arrow Connector 12">
+            <a:extLst>
+              <a:ext uri="{FF2B5EF4-FFF2-40B4-BE49-F238E27FC236}">
+                <a16:creationId xmlns:a16="http://schemas.microsoft.com/office/drawing/2014/main" id="{A9220333-4CEA-437F-8257-39B43E176E37}"/>
+              </a:ext>
+            </a:extLst>
+          </p:cNvPr>
+          <p:cNvCxnSpPr>
+            <a:cxnSpLocks/>
+          </p:cNvCxnSpPr>
+          <p:nvPr/>
+        </p:nvCxnSpPr>
+        <p:spPr>
+          <a:xfrm>
+            <a:off x="3775743" y="1167361"/>
+            <a:ext cx="976969" cy="241239"/>
+          </a:xfrm>
+          <a:prstGeom prst="straightConnector1">
+            <a:avLst/>
+          </a:prstGeom>
+          <a:ln w="28575">
+            <a:solidFill>
+              <a:schemeClr val="tx1"/>
+            </a:solidFill>
+            <a:tailEnd type="triangle"/>
+          </a:ln>
+          <a:effectLst>
+            <a:glow rad="38100">
+              <a:schemeClr val="bg1"/>
+            </a:glow>
+          </a:effectLst>
+        </p:spPr>
+        <p:style>
+          <a:lnRef idx="1">
+            <a:schemeClr val="accent1"/>
+          </a:lnRef>
+          <a:fillRef idx="0">
+            <a:schemeClr val="accent1"/>
+          </a:fillRef>
+          <a:effectRef idx="0">
+            <a:schemeClr val="accent1"/>
+          </a:effectRef>
+          <a:fontRef idx="minor">
+            <a:schemeClr val="tx1"/>
+          </a:fontRef>
+        </p:style>
+      </p:cxnSp>
+      <p:cxnSp>
+        <p:nvCxnSpPr>
+          <p:cNvPr id="15" name="Straight Arrow Connector 14">
+            <a:extLst>
+              <a:ext uri="{FF2B5EF4-FFF2-40B4-BE49-F238E27FC236}">
+                <a16:creationId xmlns:a16="http://schemas.microsoft.com/office/drawing/2014/main" id="{83763046-5491-4B3B-B3BF-3929F2A27D1F}"/>
+              </a:ext>
+            </a:extLst>
+          </p:cNvPr>
+          <p:cNvCxnSpPr>
+            <a:cxnSpLocks/>
+          </p:cNvCxnSpPr>
+          <p:nvPr/>
+        </p:nvCxnSpPr>
+        <p:spPr>
+          <a:xfrm>
+            <a:off x="3775742" y="1576164"/>
+            <a:ext cx="687201" cy="137232"/>
+          </a:xfrm>
+          <a:prstGeom prst="straightConnector1">
+            <a:avLst/>
+          </a:prstGeom>
+          <a:ln w="28575">
+            <a:solidFill>
+              <a:schemeClr val="tx1"/>
+            </a:solidFill>
+            <a:tailEnd type="triangle"/>
+          </a:ln>
+          <a:effectLst>
+            <a:glow rad="38100">
+              <a:schemeClr val="bg1"/>
+            </a:glow>
+          </a:effectLst>
+        </p:spPr>
+        <p:style>
+          <a:lnRef idx="1">
+            <a:schemeClr val="accent1"/>
+          </a:lnRef>
+          <a:fillRef idx="0">
+            <a:schemeClr val="accent1"/>
+          </a:fillRef>
+          <a:effectRef idx="0">
+            <a:schemeClr val="accent1"/>
+          </a:effectRef>
+          <a:fontRef idx="minor">
+            <a:schemeClr val="tx1"/>
+          </a:fontRef>
+        </p:style>
+      </p:cxnSp>
+      <p:cxnSp>
+        <p:nvCxnSpPr>
+          <p:cNvPr id="17" name="Straight Arrow Connector 16">
+            <a:extLst>
+              <a:ext uri="{FF2B5EF4-FFF2-40B4-BE49-F238E27FC236}">
+                <a16:creationId xmlns:a16="http://schemas.microsoft.com/office/drawing/2014/main" id="{5FA890B6-6C6E-4E71-8BAC-E7D5A6D016D2}"/>
+              </a:ext>
+            </a:extLst>
+          </p:cNvPr>
+          <p:cNvCxnSpPr>
+            <a:cxnSpLocks/>
+          </p:cNvCxnSpPr>
+          <p:nvPr/>
+        </p:nvCxnSpPr>
+        <p:spPr>
+          <a:xfrm flipV="1">
+            <a:off x="3775742" y="3667976"/>
+            <a:ext cx="976970" cy="0"/>
+          </a:xfrm>
+          <a:prstGeom prst="straightConnector1">
+            <a:avLst/>
+          </a:prstGeom>
+          <a:ln w="28575">
+            <a:solidFill>
+              <a:schemeClr val="tx1"/>
+            </a:solidFill>
+            <a:tailEnd type="triangle"/>
+          </a:ln>
+          <a:effectLst>
+            <a:glow rad="38100">
+              <a:schemeClr val="bg1"/>
+            </a:glow>
+          </a:effectLst>
+        </p:spPr>
+        <p:style>
+          <a:lnRef idx="1">
+            <a:schemeClr val="accent1"/>
+          </a:lnRef>
+          <a:fillRef idx="0">
+            <a:schemeClr val="accent1"/>
+          </a:fillRef>
+          <a:effectRef idx="0">
+            <a:schemeClr val="accent1"/>
+          </a:effectRef>
+          <a:fontRef idx="minor">
+            <a:schemeClr val="tx1"/>
+          </a:fontRef>
+        </p:style>
+      </p:cxnSp>
+      <p:cxnSp>
+        <p:nvCxnSpPr>
+          <p:cNvPr id="19" name="Straight Arrow Connector 18">
+            <a:extLst>
+              <a:ext uri="{FF2B5EF4-FFF2-40B4-BE49-F238E27FC236}">
+                <a16:creationId xmlns:a16="http://schemas.microsoft.com/office/drawing/2014/main" id="{BE900355-F6F7-4173-AA0E-7274E0DCE07F}"/>
+              </a:ext>
+            </a:extLst>
+          </p:cNvPr>
+          <p:cNvCxnSpPr>
+            <a:cxnSpLocks/>
+          </p:cNvCxnSpPr>
+          <p:nvPr/>
+        </p:nvCxnSpPr>
+        <p:spPr>
+          <a:xfrm flipV="1">
+            <a:off x="3775742" y="4177719"/>
+            <a:ext cx="1914183" cy="0"/>
+          </a:xfrm>
+          <a:prstGeom prst="straightConnector1">
+            <a:avLst/>
+          </a:prstGeom>
+          <a:ln w="28575">
+            <a:solidFill>
+              <a:schemeClr val="tx1"/>
+            </a:solidFill>
+            <a:tailEnd type="triangle"/>
+          </a:ln>
+          <a:effectLst>
+            <a:glow rad="38100">
+              <a:schemeClr val="bg1"/>
+            </a:glow>
+          </a:effectLst>
+        </p:spPr>
+        <p:style>
+          <a:lnRef idx="1">
+            <a:schemeClr val="accent1"/>
+          </a:lnRef>
+          <a:fillRef idx="0">
+            <a:schemeClr val="accent1"/>
+          </a:fillRef>
+          <a:effectRef idx="0">
+            <a:schemeClr val="accent1"/>
+          </a:effectRef>
+          <a:fontRef idx="minor">
+            <a:schemeClr val="tx1"/>
+          </a:fontRef>
+        </p:style>
+      </p:cxnSp>
+      <p:cxnSp>
+        <p:nvCxnSpPr>
+          <p:cNvPr id="22" name="Straight Arrow Connector 21">
+            <a:extLst>
+              <a:ext uri="{FF2B5EF4-FFF2-40B4-BE49-F238E27FC236}">
+                <a16:creationId xmlns:a16="http://schemas.microsoft.com/office/drawing/2014/main" id="{14A45FBF-9A85-4DAC-887E-DA397186538E}"/>
+              </a:ext>
+            </a:extLst>
+          </p:cNvPr>
+          <p:cNvCxnSpPr>
+            <a:cxnSpLocks/>
+          </p:cNvCxnSpPr>
+          <p:nvPr/>
+        </p:nvCxnSpPr>
+        <p:spPr>
+          <a:xfrm flipV="1">
+            <a:off x="3775742" y="5151074"/>
+            <a:ext cx="1804731" cy="0"/>
+          </a:xfrm>
+          <a:prstGeom prst="straightConnector1">
+            <a:avLst/>
+          </a:prstGeom>
+          <a:ln w="28575">
+            <a:solidFill>
+              <a:schemeClr val="tx1"/>
+            </a:solidFill>
+            <a:tailEnd type="triangle"/>
+          </a:ln>
+          <a:effectLst>
+            <a:glow rad="38100">
+              <a:schemeClr val="bg1"/>
+            </a:glow>
+          </a:effectLst>
+        </p:spPr>
+        <p:style>
+          <a:lnRef idx="1">
+            <a:schemeClr val="accent1"/>
+          </a:lnRef>
+          <a:fillRef idx="0">
+            <a:schemeClr val="accent1"/>
+          </a:fillRef>
+          <a:effectRef idx="0">
+            <a:schemeClr val="accent1"/>
+          </a:effectRef>
+          <a:fontRef idx="minor">
+            <a:schemeClr val="tx1"/>
+          </a:fontRef>
+        </p:style>
+      </p:cxnSp>
+      <p:cxnSp>
+        <p:nvCxnSpPr>
+          <p:cNvPr id="24" name="Straight Arrow Connector 23">
+            <a:extLst>
+              <a:ext uri="{FF2B5EF4-FFF2-40B4-BE49-F238E27FC236}">
+                <a16:creationId xmlns:a16="http://schemas.microsoft.com/office/drawing/2014/main" id="{9D1D6587-3790-46E8-8EEC-D226FCEFC863}"/>
+              </a:ext>
+            </a:extLst>
+          </p:cNvPr>
+          <p:cNvCxnSpPr>
+            <a:cxnSpLocks/>
+            <a:stCxn id="3" idx="3"/>
+          </p:cNvCxnSpPr>
+          <p:nvPr/>
+        </p:nvCxnSpPr>
+        <p:spPr>
+          <a:xfrm flipV="1">
+            <a:off x="3778814" y="1778521"/>
+            <a:ext cx="1546675" cy="444562"/>
+          </a:xfrm>
+          <a:prstGeom prst="straightConnector1">
+            <a:avLst/>
+          </a:prstGeom>
+          <a:ln w="28575">
+            <a:solidFill>
+              <a:schemeClr val="tx1"/>
+            </a:solidFill>
+            <a:tailEnd type="triangle"/>
+          </a:ln>
+          <a:effectLst>
+            <a:glow rad="38100">
+              <a:schemeClr val="bg1"/>
+            </a:glow>
+          </a:effectLst>
+        </p:spPr>
+        <p:style>
+          <a:lnRef idx="1">
+            <a:schemeClr val="accent1"/>
+          </a:lnRef>
+          <a:fillRef idx="0">
+            <a:schemeClr val="accent1"/>
+          </a:fillRef>
+          <a:effectRef idx="0">
+            <a:schemeClr val="accent1"/>
+          </a:effectRef>
+          <a:fontRef idx="minor">
+            <a:schemeClr val="tx1"/>
+          </a:fontRef>
+        </p:style>
+      </p:cxnSp>
+      <p:cxnSp>
+        <p:nvCxnSpPr>
+          <p:cNvPr id="28" name="Straight Arrow Connector 27">
+            <a:extLst>
+              <a:ext uri="{FF2B5EF4-FFF2-40B4-BE49-F238E27FC236}">
+                <a16:creationId xmlns:a16="http://schemas.microsoft.com/office/drawing/2014/main" id="{A62339D6-AE5C-41A5-A826-B48E6D1250D0}"/>
+              </a:ext>
+            </a:extLst>
+          </p:cNvPr>
+          <p:cNvCxnSpPr>
+            <a:cxnSpLocks/>
+          </p:cNvCxnSpPr>
+          <p:nvPr/>
+        </p:nvCxnSpPr>
+        <p:spPr>
+          <a:xfrm>
+            <a:off x="3775742" y="5690639"/>
+            <a:ext cx="1589566" cy="288696"/>
+          </a:xfrm>
+          <a:prstGeom prst="straightConnector1">
+            <a:avLst/>
+          </a:prstGeom>
+          <a:ln w="28575">
+            <a:solidFill>
+              <a:schemeClr val="tx1"/>
+            </a:solidFill>
+            <a:tailEnd type="triangle"/>
+          </a:ln>
+          <a:effectLst>
+            <a:glow rad="38100">
+              <a:schemeClr val="bg1"/>
+            </a:glow>
+          </a:effectLst>
+        </p:spPr>
+        <p:style>
+          <a:lnRef idx="1">
+            <a:schemeClr val="accent1"/>
+          </a:lnRef>
+          <a:fillRef idx="0">
+            <a:schemeClr val="accent1"/>
+          </a:fillRef>
+          <a:effectRef idx="0">
+            <a:schemeClr val="accent1"/>
+          </a:effectRef>
+          <a:fontRef idx="minor">
+            <a:schemeClr val="tx1"/>
+          </a:fontRef>
+        </p:style>
+      </p:cxnSp>
+      <p:cxnSp>
+        <p:nvCxnSpPr>
+          <p:cNvPr id="30" name="Straight Arrow Connector 29">
+            <a:extLst>
+              <a:ext uri="{FF2B5EF4-FFF2-40B4-BE49-F238E27FC236}">
+                <a16:creationId xmlns:a16="http://schemas.microsoft.com/office/drawing/2014/main" id="{DD33E760-EE66-402A-8F24-7B977FEC5D24}"/>
+              </a:ext>
+            </a:extLst>
+          </p:cNvPr>
+          <p:cNvCxnSpPr>
+            <a:cxnSpLocks/>
+          </p:cNvCxnSpPr>
+          <p:nvPr/>
+        </p:nvCxnSpPr>
+        <p:spPr>
+          <a:xfrm>
+            <a:off x="3775742" y="6178117"/>
+            <a:ext cx="1549747" cy="0"/>
+          </a:xfrm>
+          <a:prstGeom prst="straightConnector1">
+            <a:avLst/>
+          </a:prstGeom>
+          <a:ln w="28575">
+            <a:solidFill>
+              <a:schemeClr val="tx1"/>
+            </a:solidFill>
+            <a:tailEnd type="triangle"/>
+          </a:ln>
+          <a:effectLst>
+            <a:glow rad="38100">
+              <a:schemeClr val="bg1"/>
+            </a:glow>
+          </a:effectLst>
+        </p:spPr>
+        <p:style>
+          <a:lnRef idx="1">
+            <a:schemeClr val="accent1"/>
+          </a:lnRef>
+          <a:fillRef idx="0">
+            <a:schemeClr val="accent1"/>
+          </a:fillRef>
+          <a:effectRef idx="0">
+            <a:schemeClr val="accent1"/>
+          </a:effectRef>
+          <a:fontRef idx="minor">
+            <a:schemeClr val="tx1"/>
+          </a:fontRef>
+        </p:style>
+      </p:cxnSp>
+      <p:sp>
+        <p:nvSpPr>
+          <p:cNvPr id="33" name="TextBox 32">
+            <a:extLst>
+              <a:ext uri="{FF2B5EF4-FFF2-40B4-BE49-F238E27FC236}">
+                <a16:creationId xmlns:a16="http://schemas.microsoft.com/office/drawing/2014/main" id="{79F5739C-3986-493F-B99C-4DAC176AEF9F}"/>
+              </a:ext>
+            </a:extLst>
+          </p:cNvPr>
+          <p:cNvSpPr txBox="1"/>
+          <p:nvPr/>
+        </p:nvSpPr>
+        <p:spPr>
+          <a:xfrm>
+            <a:off x="3471518" y="559776"/>
+            <a:ext cx="317716" cy="369332"/>
+          </a:xfrm>
+          <a:prstGeom prst="rect">
+            <a:avLst/>
+          </a:prstGeom>
+          <a:noFill/>
+        </p:spPr>
+        <p:txBody>
+          <a:bodyPr wrap="none" rtlCol="0">
+            <a:spAutoFit/>
+          </a:bodyPr>
+          <a:lstStyle/>
+          <a:p>
+            <a:pPr algn="ctr"/>
+            <a:r>
+              <a:rPr lang="en-US" dirty="0"/>
+              <a:t>B</a:t>
+            </a:r>
+          </a:p>
+        </p:txBody>
+      </p:sp>
+      <p:sp>
+        <p:nvSpPr>
+          <p:cNvPr id="34" name="TextBox 33">
+            <a:extLst>
+              <a:ext uri="{FF2B5EF4-FFF2-40B4-BE49-F238E27FC236}">
+                <a16:creationId xmlns:a16="http://schemas.microsoft.com/office/drawing/2014/main" id="{4C00581A-7DFA-416F-B51F-E6C8F2D87E61}"/>
+              </a:ext>
+            </a:extLst>
+          </p:cNvPr>
+          <p:cNvSpPr txBox="1"/>
+          <p:nvPr/>
+        </p:nvSpPr>
+        <p:spPr>
+          <a:xfrm>
+            <a:off x="3471518" y="980275"/>
+            <a:ext cx="317716" cy="369332"/>
+          </a:xfrm>
+          <a:prstGeom prst="rect">
+            <a:avLst/>
+          </a:prstGeom>
+          <a:noFill/>
+        </p:spPr>
+        <p:txBody>
+          <a:bodyPr wrap="none" rtlCol="0">
+            <a:spAutoFit/>
+          </a:bodyPr>
+          <a:lstStyle/>
+          <a:p>
+            <a:pPr algn="ctr"/>
+            <a:r>
+              <a:rPr lang="en-US" dirty="0"/>
+              <a:t>C</a:t>
+            </a:r>
+          </a:p>
+        </p:txBody>
+      </p:sp>
+      <p:sp>
+        <p:nvSpPr>
+          <p:cNvPr id="35" name="TextBox 34">
+            <a:extLst>
+              <a:ext uri="{FF2B5EF4-FFF2-40B4-BE49-F238E27FC236}">
+                <a16:creationId xmlns:a16="http://schemas.microsoft.com/office/drawing/2014/main" id="{0F5E2F83-B6CC-45A5-91F1-7A28C96CABD0}"/>
+              </a:ext>
+            </a:extLst>
+          </p:cNvPr>
+          <p:cNvSpPr txBox="1"/>
+          <p:nvPr/>
+        </p:nvSpPr>
+        <p:spPr>
+          <a:xfrm>
+            <a:off x="3466709" y="1400774"/>
+            <a:ext cx="327334" cy="369332"/>
+          </a:xfrm>
+          <a:prstGeom prst="rect">
+            <a:avLst/>
+          </a:prstGeom>
+          <a:noFill/>
+        </p:spPr>
+        <p:txBody>
+          <a:bodyPr wrap="none" rtlCol="0">
+            <a:spAutoFit/>
+          </a:bodyPr>
+          <a:lstStyle/>
+          <a:p>
+            <a:pPr algn="ctr"/>
+            <a:r>
+              <a:rPr lang="en-US" dirty="0"/>
+              <a:t>D</a:t>
+            </a:r>
+          </a:p>
+        </p:txBody>
+      </p:sp>
+      <p:sp>
+        <p:nvSpPr>
+          <p:cNvPr id="36" name="TextBox 35">
+            <a:extLst>
+              <a:ext uri="{FF2B5EF4-FFF2-40B4-BE49-F238E27FC236}">
+                <a16:creationId xmlns:a16="http://schemas.microsoft.com/office/drawing/2014/main" id="{66F88542-FE9A-4BAE-85C0-4C3A04C41C85}"/>
+              </a:ext>
+            </a:extLst>
+          </p:cNvPr>
+          <p:cNvSpPr txBox="1"/>
+          <p:nvPr/>
+        </p:nvSpPr>
+        <p:spPr>
+          <a:xfrm>
+            <a:off x="3485144" y="2505314"/>
+            <a:ext cx="290464" cy="369332"/>
+          </a:xfrm>
+          <a:prstGeom prst="rect">
+            <a:avLst/>
+          </a:prstGeom>
+          <a:noFill/>
+        </p:spPr>
+        <p:txBody>
+          <a:bodyPr wrap="none" rtlCol="0">
+            <a:spAutoFit/>
+          </a:bodyPr>
+          <a:lstStyle/>
+          <a:p>
+            <a:pPr algn="ctr"/>
+            <a:r>
+              <a:rPr lang="en-US" dirty="0"/>
+              <a:t>F</a:t>
+            </a:r>
+          </a:p>
+        </p:txBody>
+      </p:sp>
+      <p:sp>
+        <p:nvSpPr>
+          <p:cNvPr id="37" name="TextBox 36">
+            <a:extLst>
+              <a:ext uri="{FF2B5EF4-FFF2-40B4-BE49-F238E27FC236}">
+                <a16:creationId xmlns:a16="http://schemas.microsoft.com/office/drawing/2014/main" id="{76960043-A596-4436-9D01-91A61AD42FFE}"/>
+              </a:ext>
+            </a:extLst>
+          </p:cNvPr>
+          <p:cNvSpPr txBox="1"/>
+          <p:nvPr/>
+        </p:nvSpPr>
+        <p:spPr>
+          <a:xfrm>
+            <a:off x="3465908" y="3497837"/>
+            <a:ext cx="328936" cy="369332"/>
+          </a:xfrm>
+          <a:prstGeom prst="rect">
+            <a:avLst/>
+          </a:prstGeom>
+          <a:noFill/>
+        </p:spPr>
+        <p:txBody>
+          <a:bodyPr wrap="none" rtlCol="0">
+            <a:spAutoFit/>
+          </a:bodyPr>
+          <a:lstStyle/>
+          <a:p>
+            <a:pPr algn="ctr"/>
+            <a:r>
+              <a:rPr lang="en-US" dirty="0"/>
+              <a:t>H</a:t>
+            </a:r>
+          </a:p>
+        </p:txBody>
+      </p:sp>
+      <p:sp>
+        <p:nvSpPr>
+          <p:cNvPr id="38" name="TextBox 37">
+            <a:extLst>
+              <a:ext uri="{FF2B5EF4-FFF2-40B4-BE49-F238E27FC236}">
+                <a16:creationId xmlns:a16="http://schemas.microsoft.com/office/drawing/2014/main" id="{AAF83B4F-FD69-48FB-A965-9DDE14765552}"/>
+              </a:ext>
+            </a:extLst>
+          </p:cNvPr>
+          <p:cNvSpPr txBox="1"/>
+          <p:nvPr/>
+        </p:nvSpPr>
+        <p:spPr>
+          <a:xfrm>
+            <a:off x="3509189" y="3983355"/>
+            <a:ext cx="242374" cy="369332"/>
+          </a:xfrm>
+          <a:prstGeom prst="rect">
+            <a:avLst/>
+          </a:prstGeom>
+          <a:noFill/>
+        </p:spPr>
+        <p:txBody>
+          <a:bodyPr wrap="none" rtlCol="0">
+            <a:spAutoFit/>
+          </a:bodyPr>
+          <a:lstStyle/>
+          <a:p>
+            <a:pPr algn="ctr"/>
+            <a:r>
+              <a:rPr lang="en-US" dirty="0"/>
+              <a:t>I</a:t>
+            </a:r>
+          </a:p>
+        </p:txBody>
+      </p:sp>
+      <p:sp>
+        <p:nvSpPr>
+          <p:cNvPr id="39" name="TextBox 38">
+            <a:extLst>
+              <a:ext uri="{FF2B5EF4-FFF2-40B4-BE49-F238E27FC236}">
+                <a16:creationId xmlns:a16="http://schemas.microsoft.com/office/drawing/2014/main" id="{6E5C945F-0376-4BED-8DB3-5AA05FA542DB}"/>
+              </a:ext>
+            </a:extLst>
+          </p:cNvPr>
+          <p:cNvSpPr txBox="1"/>
+          <p:nvPr/>
+        </p:nvSpPr>
+        <p:spPr>
+          <a:xfrm>
+            <a:off x="3501174" y="4963862"/>
+            <a:ext cx="258404" cy="369332"/>
+          </a:xfrm>
+          <a:prstGeom prst="rect">
+            <a:avLst/>
+          </a:prstGeom>
+          <a:noFill/>
+        </p:spPr>
+        <p:txBody>
+          <a:bodyPr wrap="none" rtlCol="0">
+            <a:spAutoFit/>
+          </a:bodyPr>
+          <a:lstStyle/>
+          <a:p>
+            <a:pPr algn="ctr"/>
+            <a:r>
+              <a:rPr lang="en-US" dirty="0"/>
+              <a:t>J</a:t>
+            </a:r>
+          </a:p>
+        </p:txBody>
+      </p:sp>
+      <p:sp>
+        <p:nvSpPr>
+          <p:cNvPr id="40" name="TextBox 39">
+            <a:extLst>
+              <a:ext uri="{FF2B5EF4-FFF2-40B4-BE49-F238E27FC236}">
+                <a16:creationId xmlns:a16="http://schemas.microsoft.com/office/drawing/2014/main" id="{1D98D914-0706-486F-91DB-5ED390EB4A41}"/>
+              </a:ext>
+            </a:extLst>
+          </p:cNvPr>
+          <p:cNvSpPr txBox="1"/>
+          <p:nvPr/>
+        </p:nvSpPr>
+        <p:spPr>
+          <a:xfrm>
+            <a:off x="3477930" y="5498235"/>
+            <a:ext cx="304892" cy="369332"/>
+          </a:xfrm>
+          <a:prstGeom prst="rect">
+            <a:avLst/>
+          </a:prstGeom>
+          <a:noFill/>
+        </p:spPr>
+        <p:txBody>
+          <a:bodyPr wrap="none" rtlCol="0">
+            <a:spAutoFit/>
+          </a:bodyPr>
+          <a:lstStyle/>
+          <a:p>
+            <a:pPr algn="ctr"/>
+            <a:r>
+              <a:rPr lang="en-US" dirty="0"/>
+              <a:t>K</a:t>
+            </a:r>
+          </a:p>
+        </p:txBody>
+      </p:sp>
+      <p:sp>
+        <p:nvSpPr>
+          <p:cNvPr id="41" name="TextBox 40">
+            <a:extLst>
+              <a:ext uri="{FF2B5EF4-FFF2-40B4-BE49-F238E27FC236}">
+                <a16:creationId xmlns:a16="http://schemas.microsoft.com/office/drawing/2014/main" id="{4766C85C-FCE8-42BF-A38D-8A99500DE007}"/>
+              </a:ext>
+            </a:extLst>
+          </p:cNvPr>
+          <p:cNvSpPr txBox="1"/>
+          <p:nvPr/>
+        </p:nvSpPr>
+        <p:spPr>
+          <a:xfrm>
+            <a:off x="3489151" y="6012730"/>
+            <a:ext cx="282450" cy="369332"/>
+          </a:xfrm>
+          <a:prstGeom prst="rect">
+            <a:avLst/>
+          </a:prstGeom>
+          <a:noFill/>
+        </p:spPr>
+        <p:txBody>
+          <a:bodyPr wrap="none" rtlCol="0">
+            <a:spAutoFit/>
+          </a:bodyPr>
+          <a:lstStyle/>
+          <a:p>
+            <a:pPr algn="ctr"/>
+            <a:r>
+              <a:rPr lang="en-US" dirty="0"/>
+              <a:t>L</a:t>
+            </a:r>
+          </a:p>
+        </p:txBody>
+      </p:sp>
+      <p:cxnSp>
+        <p:nvCxnSpPr>
+          <p:cNvPr id="42" name="Straight Arrow Connector 41">
+            <a:extLst>
+              <a:ext uri="{FF2B5EF4-FFF2-40B4-BE49-F238E27FC236}">
+                <a16:creationId xmlns:a16="http://schemas.microsoft.com/office/drawing/2014/main" id="{260E401D-A786-4D0B-B9C5-3EF61082453C}"/>
+              </a:ext>
+            </a:extLst>
+          </p:cNvPr>
+          <p:cNvCxnSpPr>
+            <a:cxnSpLocks/>
+          </p:cNvCxnSpPr>
+          <p:nvPr/>
+        </p:nvCxnSpPr>
+        <p:spPr>
+          <a:xfrm>
+            <a:off x="3789900" y="3154454"/>
+            <a:ext cx="1448022" cy="0"/>
+          </a:xfrm>
+          <a:prstGeom prst="straightConnector1">
+            <a:avLst/>
+          </a:prstGeom>
+          <a:ln w="28575">
+            <a:solidFill>
+              <a:schemeClr val="tx1"/>
+            </a:solidFill>
+            <a:tailEnd type="triangle"/>
+          </a:ln>
+          <a:effectLst>
+            <a:glow rad="38100">
+              <a:schemeClr val="bg1"/>
+            </a:glow>
+          </a:effectLst>
+        </p:spPr>
+        <p:style>
+          <a:lnRef idx="1">
+            <a:schemeClr val="accent1"/>
+          </a:lnRef>
+          <a:fillRef idx="0">
+            <a:schemeClr val="accent1"/>
+          </a:fillRef>
+          <a:effectRef idx="0">
+            <a:schemeClr val="accent1"/>
+          </a:effectRef>
+          <a:fontRef idx="minor">
+            <a:schemeClr val="tx1"/>
+          </a:fontRef>
+        </p:style>
+      </p:cxnSp>
+      <p:sp>
+        <p:nvSpPr>
+          <p:cNvPr id="44" name="TextBox 43">
+            <a:extLst>
+              <a:ext uri="{FF2B5EF4-FFF2-40B4-BE49-F238E27FC236}">
+                <a16:creationId xmlns:a16="http://schemas.microsoft.com/office/drawing/2014/main" id="{111D47F5-A169-48DA-B588-0764859CF396}"/>
+              </a:ext>
+            </a:extLst>
+          </p:cNvPr>
+          <p:cNvSpPr txBox="1"/>
+          <p:nvPr/>
+        </p:nvSpPr>
+        <p:spPr>
+          <a:xfrm>
+            <a:off x="3465106" y="2944851"/>
+            <a:ext cx="330540" cy="369332"/>
+          </a:xfrm>
+          <a:prstGeom prst="rect">
+            <a:avLst/>
+          </a:prstGeom>
+          <a:noFill/>
+        </p:spPr>
+        <p:txBody>
+          <a:bodyPr wrap="none" rtlCol="0">
+            <a:spAutoFit/>
+          </a:bodyPr>
+          <a:lstStyle/>
+          <a:p>
+            <a:pPr algn="ctr"/>
+            <a:r>
+              <a:rPr lang="en-US" dirty="0"/>
+              <a:t>G</a:t>
+            </a:r>
+          </a:p>
+        </p:txBody>
+      </p:sp>
+      <p:sp>
+        <p:nvSpPr>
+          <p:cNvPr id="45" name="TextBox 44">
+            <a:extLst>
+              <a:ext uri="{FF2B5EF4-FFF2-40B4-BE49-F238E27FC236}">
+                <a16:creationId xmlns:a16="http://schemas.microsoft.com/office/drawing/2014/main" id="{9DA77217-1454-430B-ADAF-7A92DB086428}"/>
+              </a:ext>
+            </a:extLst>
+          </p:cNvPr>
+          <p:cNvSpPr txBox="1"/>
+          <p:nvPr/>
+        </p:nvSpPr>
+        <p:spPr>
+          <a:xfrm>
+            <a:off x="3471518" y="75879"/>
+            <a:ext cx="317716" cy="369332"/>
+          </a:xfrm>
+          <a:prstGeom prst="rect">
+            <a:avLst/>
+          </a:prstGeom>
+          <a:noFill/>
+        </p:spPr>
+        <p:txBody>
+          <a:bodyPr wrap="none" rtlCol="0">
+            <a:spAutoFit/>
+          </a:bodyPr>
+          <a:lstStyle/>
+          <a:p>
+            <a:pPr algn="ctr"/>
+            <a:r>
+              <a:rPr lang="en-US" dirty="0"/>
+              <a:t>A</a:t>
+            </a:r>
+          </a:p>
+        </p:txBody>
+      </p:sp>
+      <p:cxnSp>
+        <p:nvCxnSpPr>
+          <p:cNvPr id="46" name="Straight Arrow Connector 45">
+            <a:extLst>
+              <a:ext uri="{FF2B5EF4-FFF2-40B4-BE49-F238E27FC236}">
+                <a16:creationId xmlns:a16="http://schemas.microsoft.com/office/drawing/2014/main" id="{A4F39BEA-C3BC-4FC9-9CFE-ED947BECF23C}"/>
+              </a:ext>
+            </a:extLst>
+          </p:cNvPr>
+          <p:cNvCxnSpPr>
+            <a:cxnSpLocks/>
+          </p:cNvCxnSpPr>
+          <p:nvPr/>
+        </p:nvCxnSpPr>
+        <p:spPr>
+          <a:xfrm flipV="1">
+            <a:off x="3763426" y="267318"/>
+            <a:ext cx="2110600" cy="0"/>
+          </a:xfrm>
+          <a:prstGeom prst="straightConnector1">
+            <a:avLst/>
+          </a:prstGeom>
+          <a:ln w="28575">
+            <a:solidFill>
+              <a:schemeClr val="tx1"/>
+            </a:solidFill>
+            <a:tailEnd type="triangle"/>
+          </a:ln>
+          <a:effectLst>
+            <a:glow rad="38100">
+              <a:schemeClr val="bg1"/>
+            </a:glow>
+          </a:effectLst>
+        </p:spPr>
+        <p:style>
+          <a:lnRef idx="1">
+            <a:schemeClr val="accent1"/>
+          </a:lnRef>
+          <a:fillRef idx="0">
+            <a:schemeClr val="accent1"/>
+          </a:fillRef>
+          <a:effectRef idx="0">
+            <a:schemeClr val="accent1"/>
+          </a:effectRef>
+          <a:fontRef idx="minor">
+            <a:schemeClr val="tx1"/>
+          </a:fontRef>
+        </p:style>
+      </p:cxnSp>
+    </p:spTree>
+    <p:extLst>
+      <p:ext uri="{BB962C8B-B14F-4D97-AF65-F5344CB8AC3E}">
+        <p14:creationId xmlns:p14="http://schemas.microsoft.com/office/powerpoint/2010/main" val="1883874907"/>
+      </p:ext>
+    </p:extLst>
+  </p:cSld>
+  <p:clrMapOvr>
+    <a:masterClrMapping/>
+  </p:clrMapOvr>
+</p:sld>
+</file>
+
+<file path=ppt/slides/slide4.xml><?xml version="1.0" encoding="utf-8"?>
+<p:sld xmlns:a="http://schemas.openxmlformats.org/drawingml/2006/main" xmlns:r="http://schemas.openxmlformats.org/officeDocument/2006/relationships" xmlns:p="http://schemas.openxmlformats.org/presentationml/2006/main">
+  <p:cSld>
+    <p:spTree>
+      <p:nvGrpSpPr>
+        <p:cNvPr id="1" name=""/>
+        <p:cNvGrpSpPr/>
+        <p:nvPr/>
+      </p:nvGrpSpPr>
+      <p:grpSpPr>
+        <a:xfrm>
+          <a:off x="0" y="0"/>
+          <a:ext cx="0" cy="0"/>
+          <a:chOff x="0" y="0"/>
+          <a:chExt cx="0" cy="0"/>
+        </a:xfrm>
+      </p:grpSpPr>
       <p:pic>
         <p:nvPicPr>
-          <p:cNvPr id="8" name="Picture 7">
-            <a:extLst>
-              <a:ext uri="{FF2B5EF4-FFF2-40B4-BE49-F238E27FC236}">
-                <a16:creationId xmlns:a16="http://schemas.microsoft.com/office/drawing/2014/main" id="{FEAA8B4E-DB9F-43AE-BAE2-4C1AC32D2523}"/>
+          <p:cNvPr id="2" name="Picture 1">
+            <a:extLst>
+              <a:ext uri="{FF2B5EF4-FFF2-40B4-BE49-F238E27FC236}">
+                <a16:creationId xmlns:a16="http://schemas.microsoft.com/office/drawing/2014/main" id="{056765AC-A725-426E-A6F7-8578982A6F27}"/>
               </a:ext>
             </a:extLst>
           </p:cNvPr>
@@ -4109,31 +5648,1080 @@
           </p:cNvPicPr>
           <p:nvPr/>
         </p:nvPicPr>
-        <p:blipFill rotWithShape="1">
-          <a:blip r:embed="rId3">
-            <a:extLst>
-              <a:ext uri="{28A0092B-C50C-407E-A947-70E740481C1C}">
-                <a14:useLocalDpi xmlns:a14="http://schemas.microsoft.com/office/drawing/2010/main" val="0"/>
-              </a:ext>
-            </a:extLst>
-          </a:blip>
-          <a:srcRect l="21566" t="6556" r="34372"/>
-          <a:stretch/>
+        <p:blipFill>
+          <a:blip r:embed="rId2"/>
+          <a:stretch>
+            <a:fillRect/>
+          </a:stretch>
         </p:blipFill>
         <p:spPr>
           <a:xfrm>
-            <a:off x="8200444" y="165194"/>
-            <a:ext cx="2687444" cy="7375315"/>
+            <a:off x="4874895" y="0"/>
+            <a:ext cx="822960" cy="6858000"/>
           </a:xfrm>
           <a:prstGeom prst="rect">
             <a:avLst/>
           </a:prstGeom>
         </p:spPr>
       </p:pic>
+      <p:pic>
+        <p:nvPicPr>
+          <p:cNvPr id="3" name="Picture 2">
+            <a:extLst>
+              <a:ext uri="{FF2B5EF4-FFF2-40B4-BE49-F238E27FC236}">
+                <a16:creationId xmlns:a16="http://schemas.microsoft.com/office/drawing/2014/main" id="{049A17C3-5054-4D6B-A3F9-F1C52A1CA2B3}"/>
+              </a:ext>
+            </a:extLst>
+          </p:cNvPr>
+          <p:cNvPicPr>
+            <a:picLocks noChangeAspect="1"/>
+          </p:cNvPicPr>
+          <p:nvPr/>
+        </p:nvPicPr>
+        <p:blipFill>
+          <a:blip r:embed="rId3"/>
+          <a:stretch>
+            <a:fillRect/>
+          </a:stretch>
+        </p:blipFill>
+        <p:spPr>
+          <a:xfrm>
+            <a:off x="5697855" y="285750"/>
+            <a:ext cx="769247" cy="6572250"/>
+          </a:xfrm>
+          <a:prstGeom prst="rect">
+            <a:avLst/>
+          </a:prstGeom>
+        </p:spPr>
+      </p:pic>
+      <p:pic>
+        <p:nvPicPr>
+          <p:cNvPr id="4" name="Picture 3">
+            <a:extLst>
+              <a:ext uri="{FF2B5EF4-FFF2-40B4-BE49-F238E27FC236}">
+                <a16:creationId xmlns:a16="http://schemas.microsoft.com/office/drawing/2014/main" id="{05EC9402-38AC-456C-8681-94F75D10544E}"/>
+              </a:ext>
+            </a:extLst>
+          </p:cNvPr>
+          <p:cNvPicPr>
+            <a:picLocks noChangeAspect="1"/>
+          </p:cNvPicPr>
+          <p:nvPr/>
+        </p:nvPicPr>
+        <p:blipFill>
+          <a:blip r:embed="rId4"/>
+          <a:stretch>
+            <a:fillRect/>
+          </a:stretch>
+        </p:blipFill>
+        <p:spPr>
+          <a:xfrm>
+            <a:off x="7680276" y="2028824"/>
+            <a:ext cx="1691774" cy="1548099"/>
+          </a:xfrm>
+          <a:prstGeom prst="rect">
+            <a:avLst/>
+          </a:prstGeom>
+        </p:spPr>
+      </p:pic>
+      <p:pic>
+        <p:nvPicPr>
+          <p:cNvPr id="5" name="Picture 4">
+            <a:extLst>
+              <a:ext uri="{FF2B5EF4-FFF2-40B4-BE49-F238E27FC236}">
+                <a16:creationId xmlns:a16="http://schemas.microsoft.com/office/drawing/2014/main" id="{94789EA6-E607-4C95-A887-43713D49182E}"/>
+              </a:ext>
+            </a:extLst>
+          </p:cNvPr>
+          <p:cNvPicPr>
+            <a:picLocks noChangeAspect="1"/>
+          </p:cNvPicPr>
+          <p:nvPr/>
+        </p:nvPicPr>
+        <p:blipFill>
+          <a:blip r:embed="rId5"/>
+          <a:stretch>
+            <a:fillRect/>
+          </a:stretch>
+        </p:blipFill>
+        <p:spPr>
+          <a:xfrm>
+            <a:off x="7803784" y="157450"/>
+            <a:ext cx="1444759" cy="1466850"/>
+          </a:xfrm>
+          <a:prstGeom prst="rect">
+            <a:avLst/>
+          </a:prstGeom>
+        </p:spPr>
+      </p:pic>
+      <p:pic>
+        <p:nvPicPr>
+          <p:cNvPr id="6" name="Picture 5">
+            <a:extLst>
+              <a:ext uri="{FF2B5EF4-FFF2-40B4-BE49-F238E27FC236}">
+                <a16:creationId xmlns:a16="http://schemas.microsoft.com/office/drawing/2014/main" id="{98C4C121-064E-41B0-9434-2CFD84E9BBD5}"/>
+              </a:ext>
+            </a:extLst>
+          </p:cNvPr>
+          <p:cNvPicPr>
+            <a:picLocks noChangeAspect="1"/>
+          </p:cNvPicPr>
+          <p:nvPr/>
+        </p:nvPicPr>
+        <p:blipFill>
+          <a:blip r:embed="rId6"/>
+          <a:stretch>
+            <a:fillRect/>
+          </a:stretch>
+        </p:blipFill>
+        <p:spPr>
+          <a:xfrm>
+            <a:off x="6467102" y="285750"/>
+            <a:ext cx="526670" cy="6386800"/>
+          </a:xfrm>
+          <a:prstGeom prst="rect">
+            <a:avLst/>
+          </a:prstGeom>
+        </p:spPr>
+      </p:pic>
+      <p:sp>
+        <p:nvSpPr>
+          <p:cNvPr id="7" name="TextBox 6">
+            <a:extLst>
+              <a:ext uri="{FF2B5EF4-FFF2-40B4-BE49-F238E27FC236}">
+                <a16:creationId xmlns:a16="http://schemas.microsoft.com/office/drawing/2014/main" id="{340ACE49-CF98-4651-8C32-B50198E41EE4}"/>
+              </a:ext>
+            </a:extLst>
+          </p:cNvPr>
+          <p:cNvSpPr txBox="1"/>
+          <p:nvPr/>
+        </p:nvSpPr>
+        <p:spPr>
+          <a:xfrm>
+            <a:off x="4387613" y="304800"/>
+            <a:ext cx="317716" cy="369332"/>
+          </a:xfrm>
+          <a:prstGeom prst="rect">
+            <a:avLst/>
+          </a:prstGeom>
+          <a:noFill/>
+        </p:spPr>
+        <p:txBody>
+          <a:bodyPr wrap="square" rtlCol="0">
+            <a:spAutoFit/>
+          </a:bodyPr>
+          <a:lstStyle/>
+          <a:p>
+            <a:pPr algn="ctr"/>
+            <a:r>
+              <a:rPr lang="en-US" dirty="0"/>
+              <a:t>A</a:t>
+            </a:r>
+          </a:p>
+        </p:txBody>
+      </p:sp>
+      <p:cxnSp>
+        <p:nvCxnSpPr>
+          <p:cNvPr id="8" name="Straight Arrow Connector 7">
+            <a:extLst>
+              <a:ext uri="{FF2B5EF4-FFF2-40B4-BE49-F238E27FC236}">
+                <a16:creationId xmlns:a16="http://schemas.microsoft.com/office/drawing/2014/main" id="{03933796-E1F3-45C8-A67E-5354C7DB623B}"/>
+              </a:ext>
+            </a:extLst>
+          </p:cNvPr>
+          <p:cNvCxnSpPr>
+            <a:cxnSpLocks/>
+          </p:cNvCxnSpPr>
+          <p:nvPr/>
+        </p:nvCxnSpPr>
+        <p:spPr>
+          <a:xfrm>
+            <a:off x="4648741" y="496239"/>
+            <a:ext cx="478776" cy="0"/>
+          </a:xfrm>
+          <a:prstGeom prst="straightConnector1">
+            <a:avLst/>
+          </a:prstGeom>
+          <a:ln w="28575">
+            <a:solidFill>
+              <a:schemeClr val="tx1"/>
+            </a:solidFill>
+            <a:tailEnd type="triangle"/>
+          </a:ln>
+          <a:effectLst>
+            <a:glow rad="38100">
+              <a:schemeClr val="bg1"/>
+            </a:glow>
+          </a:effectLst>
+        </p:spPr>
+        <p:style>
+          <a:lnRef idx="1">
+            <a:schemeClr val="accent1"/>
+          </a:lnRef>
+          <a:fillRef idx="0">
+            <a:schemeClr val="accent1"/>
+          </a:fillRef>
+          <a:effectRef idx="0">
+            <a:schemeClr val="accent1"/>
+          </a:effectRef>
+          <a:fontRef idx="minor">
+            <a:schemeClr val="tx1"/>
+          </a:fontRef>
+        </p:style>
+      </p:cxnSp>
+      <p:sp>
+        <p:nvSpPr>
+          <p:cNvPr id="13" name="TextBox 12">
+            <a:extLst>
+              <a:ext uri="{FF2B5EF4-FFF2-40B4-BE49-F238E27FC236}">
+                <a16:creationId xmlns:a16="http://schemas.microsoft.com/office/drawing/2014/main" id="{1E112CBB-3AF1-46F9-A197-BE6529056F22}"/>
+              </a:ext>
+            </a:extLst>
+          </p:cNvPr>
+          <p:cNvSpPr txBox="1"/>
+          <p:nvPr/>
+        </p:nvSpPr>
+        <p:spPr>
+          <a:xfrm>
+            <a:off x="4387613" y="706209"/>
+            <a:ext cx="317716" cy="369332"/>
+          </a:xfrm>
+          <a:prstGeom prst="rect">
+            <a:avLst/>
+          </a:prstGeom>
+          <a:noFill/>
+        </p:spPr>
+        <p:txBody>
+          <a:bodyPr wrap="square" rtlCol="0">
+            <a:spAutoFit/>
+          </a:bodyPr>
+          <a:lstStyle/>
+          <a:p>
+            <a:pPr algn="ctr"/>
+            <a:r>
+              <a:rPr lang="en-US" dirty="0"/>
+              <a:t>B</a:t>
+            </a:r>
+          </a:p>
+        </p:txBody>
+      </p:sp>
+      <p:cxnSp>
+        <p:nvCxnSpPr>
+          <p:cNvPr id="14" name="Straight Arrow Connector 13">
+            <a:extLst>
+              <a:ext uri="{FF2B5EF4-FFF2-40B4-BE49-F238E27FC236}">
+                <a16:creationId xmlns:a16="http://schemas.microsoft.com/office/drawing/2014/main" id="{8610E64B-FB55-4DCD-AF94-00F73283C3E6}"/>
+              </a:ext>
+            </a:extLst>
+          </p:cNvPr>
+          <p:cNvCxnSpPr>
+            <a:cxnSpLocks/>
+          </p:cNvCxnSpPr>
+          <p:nvPr/>
+        </p:nvCxnSpPr>
+        <p:spPr>
+          <a:xfrm>
+            <a:off x="4648741" y="897648"/>
+            <a:ext cx="478776" cy="0"/>
+          </a:xfrm>
+          <a:prstGeom prst="straightConnector1">
+            <a:avLst/>
+          </a:prstGeom>
+          <a:ln w="28575">
+            <a:solidFill>
+              <a:schemeClr val="tx1"/>
+            </a:solidFill>
+            <a:tailEnd type="triangle"/>
+          </a:ln>
+          <a:effectLst>
+            <a:glow rad="38100">
+              <a:schemeClr val="bg1"/>
+            </a:glow>
+          </a:effectLst>
+        </p:spPr>
+        <p:style>
+          <a:lnRef idx="1">
+            <a:schemeClr val="accent1"/>
+          </a:lnRef>
+          <a:fillRef idx="0">
+            <a:schemeClr val="accent1"/>
+          </a:fillRef>
+          <a:effectRef idx="0">
+            <a:schemeClr val="accent1"/>
+          </a:effectRef>
+          <a:fontRef idx="minor">
+            <a:schemeClr val="tx1"/>
+          </a:fontRef>
+        </p:style>
+      </p:cxnSp>
+      <p:sp>
+        <p:nvSpPr>
+          <p:cNvPr id="16" name="TextBox 15">
+            <a:extLst>
+              <a:ext uri="{FF2B5EF4-FFF2-40B4-BE49-F238E27FC236}">
+                <a16:creationId xmlns:a16="http://schemas.microsoft.com/office/drawing/2014/main" id="{E0075D16-75D2-4936-B25E-F3836F43A29C}"/>
+              </a:ext>
+            </a:extLst>
+          </p:cNvPr>
+          <p:cNvSpPr txBox="1"/>
+          <p:nvPr/>
+        </p:nvSpPr>
+        <p:spPr>
+          <a:xfrm>
+            <a:off x="4356832" y="2450643"/>
+            <a:ext cx="379279" cy="369332"/>
+          </a:xfrm>
+          <a:prstGeom prst="rect">
+            <a:avLst/>
+          </a:prstGeom>
+          <a:noFill/>
+        </p:spPr>
+        <p:txBody>
+          <a:bodyPr wrap="square" rtlCol="0">
+            <a:spAutoFit/>
+          </a:bodyPr>
+          <a:lstStyle/>
+          <a:p>
+            <a:pPr algn="ctr"/>
+            <a:r>
+              <a:rPr lang="en-US" dirty="0"/>
+              <a:t>D</a:t>
+            </a:r>
+          </a:p>
+        </p:txBody>
+      </p:sp>
+      <p:cxnSp>
+        <p:nvCxnSpPr>
+          <p:cNvPr id="17" name="Straight Arrow Connector 16">
+            <a:extLst>
+              <a:ext uri="{FF2B5EF4-FFF2-40B4-BE49-F238E27FC236}">
+                <a16:creationId xmlns:a16="http://schemas.microsoft.com/office/drawing/2014/main" id="{975AC438-9907-4FE1-9E87-4E03A4444706}"/>
+              </a:ext>
+            </a:extLst>
+          </p:cNvPr>
+          <p:cNvCxnSpPr>
+            <a:cxnSpLocks/>
+          </p:cNvCxnSpPr>
+          <p:nvPr/>
+        </p:nvCxnSpPr>
+        <p:spPr>
+          <a:xfrm>
+            <a:off x="4648741" y="2642082"/>
+            <a:ext cx="609059" cy="0"/>
+          </a:xfrm>
+          <a:prstGeom prst="straightConnector1">
+            <a:avLst/>
+          </a:prstGeom>
+          <a:ln w="28575">
+            <a:solidFill>
+              <a:schemeClr val="tx1"/>
+            </a:solidFill>
+            <a:tailEnd type="triangle"/>
+          </a:ln>
+          <a:effectLst>
+            <a:glow rad="38100">
+              <a:schemeClr val="bg1"/>
+            </a:glow>
+          </a:effectLst>
+        </p:spPr>
+        <p:style>
+          <a:lnRef idx="1">
+            <a:schemeClr val="accent1"/>
+          </a:lnRef>
+          <a:fillRef idx="0">
+            <a:schemeClr val="accent1"/>
+          </a:fillRef>
+          <a:effectRef idx="0">
+            <a:schemeClr val="accent1"/>
+          </a:effectRef>
+          <a:fontRef idx="minor">
+            <a:schemeClr val="tx1"/>
+          </a:fontRef>
+        </p:style>
+      </p:cxnSp>
+      <p:sp>
+        <p:nvSpPr>
+          <p:cNvPr id="19" name="TextBox 18">
+            <a:extLst>
+              <a:ext uri="{FF2B5EF4-FFF2-40B4-BE49-F238E27FC236}">
+                <a16:creationId xmlns:a16="http://schemas.microsoft.com/office/drawing/2014/main" id="{8EC2A46A-D70E-4536-BE3B-7F73F7758879}"/>
+              </a:ext>
+            </a:extLst>
+          </p:cNvPr>
+          <p:cNvSpPr txBox="1"/>
+          <p:nvPr/>
+        </p:nvSpPr>
+        <p:spPr>
+          <a:xfrm>
+            <a:off x="4356832" y="2946882"/>
+            <a:ext cx="379279" cy="369332"/>
+          </a:xfrm>
+          <a:prstGeom prst="rect">
+            <a:avLst/>
+          </a:prstGeom>
+          <a:noFill/>
+        </p:spPr>
+        <p:txBody>
+          <a:bodyPr wrap="square" rtlCol="0">
+            <a:spAutoFit/>
+          </a:bodyPr>
+          <a:lstStyle/>
+          <a:p>
+            <a:pPr algn="ctr"/>
+            <a:r>
+              <a:rPr lang="en-US" dirty="0"/>
+              <a:t>E</a:t>
+            </a:r>
+          </a:p>
+        </p:txBody>
+      </p:sp>
+      <p:cxnSp>
+        <p:nvCxnSpPr>
+          <p:cNvPr id="20" name="Straight Arrow Connector 19">
+            <a:extLst>
+              <a:ext uri="{FF2B5EF4-FFF2-40B4-BE49-F238E27FC236}">
+                <a16:creationId xmlns:a16="http://schemas.microsoft.com/office/drawing/2014/main" id="{7D3610FF-8889-4AB4-B5A5-02264935B077}"/>
+              </a:ext>
+            </a:extLst>
+          </p:cNvPr>
+          <p:cNvCxnSpPr>
+            <a:cxnSpLocks/>
+          </p:cNvCxnSpPr>
+          <p:nvPr/>
+        </p:nvCxnSpPr>
+        <p:spPr>
+          <a:xfrm flipV="1">
+            <a:off x="4648741" y="3131548"/>
+            <a:ext cx="522444" cy="6774"/>
+          </a:xfrm>
+          <a:prstGeom prst="straightConnector1">
+            <a:avLst/>
+          </a:prstGeom>
+          <a:ln w="28575">
+            <a:solidFill>
+              <a:schemeClr val="tx1"/>
+            </a:solidFill>
+            <a:tailEnd type="triangle"/>
+          </a:ln>
+          <a:effectLst>
+            <a:glow rad="38100">
+              <a:schemeClr val="bg1"/>
+            </a:glow>
+          </a:effectLst>
+        </p:spPr>
+        <p:style>
+          <a:lnRef idx="1">
+            <a:schemeClr val="accent1"/>
+          </a:lnRef>
+          <a:fillRef idx="0">
+            <a:schemeClr val="accent1"/>
+          </a:fillRef>
+          <a:effectRef idx="0">
+            <a:schemeClr val="accent1"/>
+          </a:effectRef>
+          <a:fontRef idx="minor">
+            <a:schemeClr val="tx1"/>
+          </a:fontRef>
+        </p:style>
+      </p:cxnSp>
+      <p:sp>
+        <p:nvSpPr>
+          <p:cNvPr id="23" name="TextBox 22">
+            <a:extLst>
+              <a:ext uri="{FF2B5EF4-FFF2-40B4-BE49-F238E27FC236}">
+                <a16:creationId xmlns:a16="http://schemas.microsoft.com/office/drawing/2014/main" id="{3AD4A231-C3B2-4950-8E7C-F3B7A3DC9AFE}"/>
+              </a:ext>
+            </a:extLst>
+          </p:cNvPr>
+          <p:cNvSpPr txBox="1"/>
+          <p:nvPr/>
+        </p:nvSpPr>
+        <p:spPr>
+          <a:xfrm>
+            <a:off x="4385407" y="1479093"/>
+            <a:ext cx="379279" cy="369332"/>
+          </a:xfrm>
+          <a:prstGeom prst="rect">
+            <a:avLst/>
+          </a:prstGeom>
+          <a:noFill/>
+        </p:spPr>
+        <p:txBody>
+          <a:bodyPr wrap="square" rtlCol="0">
+            <a:spAutoFit/>
+          </a:bodyPr>
+          <a:lstStyle/>
+          <a:p>
+            <a:pPr algn="ctr"/>
+            <a:r>
+              <a:rPr lang="en-US" dirty="0"/>
+              <a:t>C</a:t>
+            </a:r>
+          </a:p>
+        </p:txBody>
+      </p:sp>
+      <p:cxnSp>
+        <p:nvCxnSpPr>
+          <p:cNvPr id="24" name="Straight Arrow Connector 23">
+            <a:extLst>
+              <a:ext uri="{FF2B5EF4-FFF2-40B4-BE49-F238E27FC236}">
+                <a16:creationId xmlns:a16="http://schemas.microsoft.com/office/drawing/2014/main" id="{506081A1-E3E3-4EE1-862A-445AFE1F8D70}"/>
+              </a:ext>
+            </a:extLst>
+          </p:cNvPr>
+          <p:cNvCxnSpPr>
+            <a:cxnSpLocks/>
+          </p:cNvCxnSpPr>
+          <p:nvPr/>
+        </p:nvCxnSpPr>
+        <p:spPr>
+          <a:xfrm flipV="1">
+            <a:off x="4677316" y="971550"/>
+            <a:ext cx="1313909" cy="698982"/>
+          </a:xfrm>
+          <a:prstGeom prst="straightConnector1">
+            <a:avLst/>
+          </a:prstGeom>
+          <a:ln w="28575">
+            <a:solidFill>
+              <a:schemeClr val="tx1"/>
+            </a:solidFill>
+            <a:tailEnd type="triangle"/>
+          </a:ln>
+          <a:effectLst>
+            <a:glow rad="38100">
+              <a:schemeClr val="bg1"/>
+            </a:glow>
+          </a:effectLst>
+        </p:spPr>
+        <p:style>
+          <a:lnRef idx="1">
+            <a:schemeClr val="accent1"/>
+          </a:lnRef>
+          <a:fillRef idx="0">
+            <a:schemeClr val="accent1"/>
+          </a:fillRef>
+          <a:effectRef idx="0">
+            <a:schemeClr val="accent1"/>
+          </a:effectRef>
+          <a:fontRef idx="minor">
+            <a:schemeClr val="tx1"/>
+          </a:fontRef>
+        </p:style>
+      </p:cxnSp>
+      <p:sp>
+        <p:nvSpPr>
+          <p:cNvPr id="26" name="TextBox 25">
+            <a:extLst>
+              <a:ext uri="{FF2B5EF4-FFF2-40B4-BE49-F238E27FC236}">
+                <a16:creationId xmlns:a16="http://schemas.microsoft.com/office/drawing/2014/main" id="{698A9756-5900-4CF1-A658-7135DA692EDE}"/>
+              </a:ext>
+            </a:extLst>
+          </p:cNvPr>
+          <p:cNvSpPr txBox="1"/>
+          <p:nvPr/>
+        </p:nvSpPr>
+        <p:spPr>
+          <a:xfrm>
+            <a:off x="7164774" y="693784"/>
+            <a:ext cx="379279" cy="369332"/>
+          </a:xfrm>
+          <a:prstGeom prst="rect">
+            <a:avLst/>
+          </a:prstGeom>
+          <a:noFill/>
+        </p:spPr>
+        <p:txBody>
+          <a:bodyPr wrap="square" rtlCol="0">
+            <a:spAutoFit/>
+          </a:bodyPr>
+          <a:lstStyle/>
+          <a:p>
+            <a:pPr algn="ctr"/>
+            <a:r>
+              <a:rPr lang="en-US" dirty="0"/>
+              <a:t>F</a:t>
+            </a:r>
+          </a:p>
+        </p:txBody>
+      </p:sp>
+      <p:cxnSp>
+        <p:nvCxnSpPr>
+          <p:cNvPr id="27" name="Straight Arrow Connector 26">
+            <a:extLst>
+              <a:ext uri="{FF2B5EF4-FFF2-40B4-BE49-F238E27FC236}">
+                <a16:creationId xmlns:a16="http://schemas.microsoft.com/office/drawing/2014/main" id="{42D0CDD8-E5A3-4156-B34B-8BFEA4A8EE81}"/>
+              </a:ext>
+            </a:extLst>
+          </p:cNvPr>
+          <p:cNvCxnSpPr>
+            <a:cxnSpLocks/>
+          </p:cNvCxnSpPr>
+          <p:nvPr/>
+        </p:nvCxnSpPr>
+        <p:spPr>
+          <a:xfrm flipH="1">
+            <a:off x="6905625" y="878450"/>
+            <a:ext cx="327821" cy="0"/>
+          </a:xfrm>
+          <a:prstGeom prst="straightConnector1">
+            <a:avLst/>
+          </a:prstGeom>
+          <a:ln w="28575">
+            <a:solidFill>
+              <a:schemeClr val="tx1"/>
+            </a:solidFill>
+            <a:tailEnd type="triangle"/>
+          </a:ln>
+          <a:effectLst>
+            <a:glow rad="38100">
+              <a:schemeClr val="bg1"/>
+            </a:glow>
+          </a:effectLst>
+        </p:spPr>
+        <p:style>
+          <a:lnRef idx="1">
+            <a:schemeClr val="accent1"/>
+          </a:lnRef>
+          <a:fillRef idx="0">
+            <a:schemeClr val="accent1"/>
+          </a:fillRef>
+          <a:effectRef idx="0">
+            <a:schemeClr val="accent1"/>
+          </a:effectRef>
+          <a:fontRef idx="minor">
+            <a:schemeClr val="tx1"/>
+          </a:fontRef>
+        </p:style>
+      </p:cxnSp>
+      <p:pic>
+        <p:nvPicPr>
+          <p:cNvPr id="31" name="Picture 30">
+            <a:extLst>
+              <a:ext uri="{FF2B5EF4-FFF2-40B4-BE49-F238E27FC236}">
+                <a16:creationId xmlns:a16="http://schemas.microsoft.com/office/drawing/2014/main" id="{291E8C5F-9C28-4C39-A4D2-A41F6AAF9476}"/>
+              </a:ext>
+            </a:extLst>
+          </p:cNvPr>
+          <p:cNvPicPr>
+            <a:picLocks noChangeAspect="1"/>
+          </p:cNvPicPr>
+          <p:nvPr/>
+        </p:nvPicPr>
+        <p:blipFill>
+          <a:blip r:embed="rId7"/>
+          <a:stretch>
+            <a:fillRect/>
+          </a:stretch>
+        </p:blipFill>
+        <p:spPr>
+          <a:xfrm>
+            <a:off x="7746951" y="3895912"/>
+            <a:ext cx="1615408" cy="1548099"/>
+          </a:xfrm>
+          <a:prstGeom prst="rect">
+            <a:avLst/>
+          </a:prstGeom>
+        </p:spPr>
+      </p:pic>
+      <p:sp>
+        <p:nvSpPr>
+          <p:cNvPr id="32" name="TextBox 31">
+            <a:extLst>
+              <a:ext uri="{FF2B5EF4-FFF2-40B4-BE49-F238E27FC236}">
+                <a16:creationId xmlns:a16="http://schemas.microsoft.com/office/drawing/2014/main" id="{25F2CEBD-7E7B-4F2E-A916-86D46CACC9BF}"/>
+              </a:ext>
+            </a:extLst>
+          </p:cNvPr>
+          <p:cNvSpPr txBox="1"/>
+          <p:nvPr/>
+        </p:nvSpPr>
+        <p:spPr>
+          <a:xfrm>
+            <a:off x="7164774" y="4488993"/>
+            <a:ext cx="379279" cy="369332"/>
+          </a:xfrm>
+          <a:prstGeom prst="rect">
+            <a:avLst/>
+          </a:prstGeom>
+          <a:noFill/>
+        </p:spPr>
+        <p:txBody>
+          <a:bodyPr wrap="square" rtlCol="0">
+            <a:spAutoFit/>
+          </a:bodyPr>
+          <a:lstStyle/>
+          <a:p>
+            <a:pPr algn="ctr"/>
+            <a:r>
+              <a:rPr lang="en-US" dirty="0"/>
+              <a:t>F</a:t>
+            </a:r>
+          </a:p>
+        </p:txBody>
+      </p:sp>
+      <p:cxnSp>
+        <p:nvCxnSpPr>
+          <p:cNvPr id="33" name="Straight Arrow Connector 32">
+            <a:extLst>
+              <a:ext uri="{FF2B5EF4-FFF2-40B4-BE49-F238E27FC236}">
+                <a16:creationId xmlns:a16="http://schemas.microsoft.com/office/drawing/2014/main" id="{B22C71EF-22A9-4B28-A209-3DF985599A09}"/>
+              </a:ext>
+            </a:extLst>
+          </p:cNvPr>
+          <p:cNvCxnSpPr>
+            <a:cxnSpLocks/>
+            <a:stCxn id="32" idx="3"/>
+          </p:cNvCxnSpPr>
+          <p:nvPr/>
+        </p:nvCxnSpPr>
+        <p:spPr>
+          <a:xfrm flipV="1">
+            <a:off x="7544053" y="4669963"/>
+            <a:ext cx="259731" cy="3696"/>
+          </a:xfrm>
+          <a:prstGeom prst="straightConnector1">
+            <a:avLst/>
+          </a:prstGeom>
+          <a:ln w="28575">
+            <a:solidFill>
+              <a:schemeClr val="tx1"/>
+            </a:solidFill>
+            <a:tailEnd type="triangle"/>
+          </a:ln>
+          <a:effectLst>
+            <a:glow rad="38100">
+              <a:schemeClr val="bg1"/>
+            </a:glow>
+          </a:effectLst>
+        </p:spPr>
+        <p:style>
+          <a:lnRef idx="1">
+            <a:schemeClr val="accent1"/>
+          </a:lnRef>
+          <a:fillRef idx="0">
+            <a:schemeClr val="accent1"/>
+          </a:fillRef>
+          <a:effectRef idx="0">
+            <a:schemeClr val="accent1"/>
+          </a:effectRef>
+          <a:fontRef idx="minor">
+            <a:schemeClr val="tx1"/>
+          </a:fontRef>
+        </p:style>
+      </p:cxnSp>
+      <p:sp>
+        <p:nvSpPr>
+          <p:cNvPr id="34" name="TextBox 33">
+            <a:extLst>
+              <a:ext uri="{FF2B5EF4-FFF2-40B4-BE49-F238E27FC236}">
+                <a16:creationId xmlns:a16="http://schemas.microsoft.com/office/drawing/2014/main" id="{BAC10C40-DC14-4E6B-9A8D-7088D3E03A4B}"/>
+              </a:ext>
+            </a:extLst>
+          </p:cNvPr>
+          <p:cNvSpPr txBox="1"/>
+          <p:nvPr/>
+        </p:nvSpPr>
+        <p:spPr>
+          <a:xfrm>
+            <a:off x="7164774" y="4946193"/>
+            <a:ext cx="379279" cy="369332"/>
+          </a:xfrm>
+          <a:prstGeom prst="rect">
+            <a:avLst/>
+          </a:prstGeom>
+          <a:noFill/>
+        </p:spPr>
+        <p:txBody>
+          <a:bodyPr wrap="square" rtlCol="0">
+            <a:spAutoFit/>
+          </a:bodyPr>
+          <a:lstStyle/>
+          <a:p>
+            <a:pPr algn="ctr"/>
+            <a:r>
+              <a:rPr lang="en-US" dirty="0"/>
+              <a:t>D</a:t>
+            </a:r>
+          </a:p>
+        </p:txBody>
+      </p:sp>
+      <p:cxnSp>
+        <p:nvCxnSpPr>
+          <p:cNvPr id="35" name="Straight Arrow Connector 34">
+            <a:extLst>
+              <a:ext uri="{FF2B5EF4-FFF2-40B4-BE49-F238E27FC236}">
+                <a16:creationId xmlns:a16="http://schemas.microsoft.com/office/drawing/2014/main" id="{C133BAF1-B944-4CAD-9C8E-5E5F9213EB0F}"/>
+              </a:ext>
+            </a:extLst>
+          </p:cNvPr>
+          <p:cNvCxnSpPr>
+            <a:cxnSpLocks/>
+            <a:stCxn id="34" idx="3"/>
+          </p:cNvCxnSpPr>
+          <p:nvPr/>
+        </p:nvCxnSpPr>
+        <p:spPr>
+          <a:xfrm flipV="1">
+            <a:off x="7544053" y="4946195"/>
+            <a:ext cx="733172" cy="184664"/>
+          </a:xfrm>
+          <a:prstGeom prst="straightConnector1">
+            <a:avLst/>
+          </a:prstGeom>
+          <a:ln w="28575">
+            <a:solidFill>
+              <a:schemeClr val="tx1"/>
+            </a:solidFill>
+            <a:tailEnd type="triangle"/>
+          </a:ln>
+          <a:effectLst>
+            <a:glow rad="38100">
+              <a:schemeClr val="bg1"/>
+            </a:glow>
+          </a:effectLst>
+        </p:spPr>
+        <p:style>
+          <a:lnRef idx="1">
+            <a:schemeClr val="accent1"/>
+          </a:lnRef>
+          <a:fillRef idx="0">
+            <a:schemeClr val="accent1"/>
+          </a:fillRef>
+          <a:effectRef idx="0">
+            <a:schemeClr val="accent1"/>
+          </a:effectRef>
+          <a:fontRef idx="minor">
+            <a:schemeClr val="tx1"/>
+          </a:fontRef>
+        </p:style>
+      </p:cxnSp>
+      <p:cxnSp>
+        <p:nvCxnSpPr>
+          <p:cNvPr id="37" name="Straight Arrow Connector 36">
+            <a:extLst>
+              <a:ext uri="{FF2B5EF4-FFF2-40B4-BE49-F238E27FC236}">
+                <a16:creationId xmlns:a16="http://schemas.microsoft.com/office/drawing/2014/main" id="{376E03AE-B569-44BD-A7E0-3DA8FDD353A3}"/>
+              </a:ext>
+            </a:extLst>
+          </p:cNvPr>
+          <p:cNvCxnSpPr>
+            <a:cxnSpLocks/>
+            <a:stCxn id="34" idx="1"/>
+          </p:cNvCxnSpPr>
+          <p:nvPr/>
+        </p:nvCxnSpPr>
+        <p:spPr>
+          <a:xfrm flipH="1">
+            <a:off x="6755048" y="5130859"/>
+            <a:ext cx="409726" cy="1097672"/>
+          </a:xfrm>
+          <a:prstGeom prst="straightConnector1">
+            <a:avLst/>
+          </a:prstGeom>
+          <a:ln w="28575">
+            <a:solidFill>
+              <a:schemeClr val="tx1"/>
+            </a:solidFill>
+            <a:tailEnd type="triangle"/>
+          </a:ln>
+          <a:effectLst>
+            <a:glow rad="38100">
+              <a:schemeClr val="bg1"/>
+            </a:glow>
+          </a:effectLst>
+        </p:spPr>
+        <p:style>
+          <a:lnRef idx="1">
+            <a:schemeClr val="accent1"/>
+          </a:lnRef>
+          <a:fillRef idx="0">
+            <a:schemeClr val="accent1"/>
+          </a:fillRef>
+          <a:effectRef idx="0">
+            <a:schemeClr val="accent1"/>
+          </a:effectRef>
+          <a:fontRef idx="minor">
+            <a:schemeClr val="tx1"/>
+          </a:fontRef>
+        </p:style>
+      </p:cxnSp>
+      <p:sp>
+        <p:nvSpPr>
+          <p:cNvPr id="40" name="TextBox 39">
+            <a:extLst>
+              <a:ext uri="{FF2B5EF4-FFF2-40B4-BE49-F238E27FC236}">
+                <a16:creationId xmlns:a16="http://schemas.microsoft.com/office/drawing/2014/main" id="{089B26D6-FA84-4CDA-AF87-9F5CFF3C28A6}"/>
+              </a:ext>
+            </a:extLst>
+          </p:cNvPr>
+          <p:cNvSpPr txBox="1"/>
+          <p:nvPr/>
+        </p:nvSpPr>
+        <p:spPr>
+          <a:xfrm>
+            <a:off x="7164774" y="1173143"/>
+            <a:ext cx="379279" cy="369332"/>
+          </a:xfrm>
+          <a:prstGeom prst="rect">
+            <a:avLst/>
+          </a:prstGeom>
+          <a:noFill/>
+        </p:spPr>
+        <p:txBody>
+          <a:bodyPr wrap="square" rtlCol="0">
+            <a:spAutoFit/>
+          </a:bodyPr>
+          <a:lstStyle/>
+          <a:p>
+            <a:pPr algn="ctr"/>
+            <a:r>
+              <a:rPr lang="en-US" dirty="0"/>
+              <a:t>G</a:t>
+            </a:r>
+          </a:p>
+        </p:txBody>
+      </p:sp>
+      <p:cxnSp>
+        <p:nvCxnSpPr>
+          <p:cNvPr id="41" name="Straight Arrow Connector 40">
+            <a:extLst>
+              <a:ext uri="{FF2B5EF4-FFF2-40B4-BE49-F238E27FC236}">
+                <a16:creationId xmlns:a16="http://schemas.microsoft.com/office/drawing/2014/main" id="{EB2DDA81-F507-43A7-B11D-9B8C976A9AA6}"/>
+              </a:ext>
+            </a:extLst>
+          </p:cNvPr>
+          <p:cNvCxnSpPr>
+            <a:cxnSpLocks/>
+            <a:stCxn id="40" idx="3"/>
+          </p:cNvCxnSpPr>
+          <p:nvPr/>
+        </p:nvCxnSpPr>
+        <p:spPr>
+          <a:xfrm flipV="1">
+            <a:off x="7544053" y="1173143"/>
+            <a:ext cx="410974" cy="184666"/>
+          </a:xfrm>
+          <a:prstGeom prst="straightConnector1">
+            <a:avLst/>
+          </a:prstGeom>
+          <a:ln w="28575">
+            <a:solidFill>
+              <a:schemeClr val="tx1"/>
+            </a:solidFill>
+            <a:tailEnd type="triangle"/>
+          </a:ln>
+          <a:effectLst>
+            <a:glow rad="38100">
+              <a:schemeClr val="bg1"/>
+            </a:glow>
+          </a:effectLst>
+        </p:spPr>
+        <p:style>
+          <a:lnRef idx="1">
+            <a:schemeClr val="accent1"/>
+          </a:lnRef>
+          <a:fillRef idx="0">
+            <a:schemeClr val="accent1"/>
+          </a:fillRef>
+          <a:effectRef idx="0">
+            <a:schemeClr val="accent1"/>
+          </a:effectRef>
+          <a:fontRef idx="minor">
+            <a:schemeClr val="tx1"/>
+          </a:fontRef>
+        </p:style>
+      </p:cxnSp>
+      <p:sp>
+        <p:nvSpPr>
+          <p:cNvPr id="44" name="TextBox 43">
+            <a:extLst>
+              <a:ext uri="{FF2B5EF4-FFF2-40B4-BE49-F238E27FC236}">
+                <a16:creationId xmlns:a16="http://schemas.microsoft.com/office/drawing/2014/main" id="{00944891-18A6-4A41-9385-5EBE63C8EC7A}"/>
+              </a:ext>
+            </a:extLst>
+          </p:cNvPr>
+          <p:cNvSpPr txBox="1"/>
+          <p:nvPr/>
+        </p:nvSpPr>
+        <p:spPr>
+          <a:xfrm>
+            <a:off x="7164774" y="2591388"/>
+            <a:ext cx="379279" cy="369332"/>
+          </a:xfrm>
+          <a:prstGeom prst="rect">
+            <a:avLst/>
+          </a:prstGeom>
+          <a:noFill/>
+        </p:spPr>
+        <p:txBody>
+          <a:bodyPr wrap="square" rtlCol="0">
+            <a:spAutoFit/>
+          </a:bodyPr>
+          <a:lstStyle/>
+          <a:p>
+            <a:pPr algn="ctr"/>
+            <a:r>
+              <a:rPr lang="en-US" dirty="0"/>
+              <a:t>F</a:t>
+            </a:r>
+          </a:p>
+        </p:txBody>
+      </p:sp>
+      <p:cxnSp>
+        <p:nvCxnSpPr>
+          <p:cNvPr id="45" name="Straight Arrow Connector 44">
+            <a:extLst>
+              <a:ext uri="{FF2B5EF4-FFF2-40B4-BE49-F238E27FC236}">
+                <a16:creationId xmlns:a16="http://schemas.microsoft.com/office/drawing/2014/main" id="{0A7A92DE-DE00-4756-BA75-D7D5BBD04BB0}"/>
+              </a:ext>
+            </a:extLst>
+          </p:cNvPr>
+          <p:cNvCxnSpPr>
+            <a:cxnSpLocks/>
+            <a:stCxn id="44" idx="3"/>
+          </p:cNvCxnSpPr>
+          <p:nvPr/>
+        </p:nvCxnSpPr>
+        <p:spPr>
+          <a:xfrm>
+            <a:off x="7544053" y="2776054"/>
+            <a:ext cx="442964" cy="6773"/>
+          </a:xfrm>
+          <a:prstGeom prst="straightConnector1">
+            <a:avLst/>
+          </a:prstGeom>
+          <a:ln w="28575">
+            <a:solidFill>
+              <a:schemeClr val="tx1"/>
+            </a:solidFill>
+            <a:tailEnd type="triangle"/>
+          </a:ln>
+          <a:effectLst>
+            <a:glow rad="38100">
+              <a:schemeClr val="bg1"/>
+            </a:glow>
+          </a:effectLst>
+        </p:spPr>
+        <p:style>
+          <a:lnRef idx="1">
+            <a:schemeClr val="accent1"/>
+          </a:lnRef>
+          <a:fillRef idx="0">
+            <a:schemeClr val="accent1"/>
+          </a:fillRef>
+          <a:effectRef idx="0">
+            <a:schemeClr val="accent1"/>
+          </a:effectRef>
+          <a:fontRef idx="minor">
+            <a:schemeClr val="tx1"/>
+          </a:fontRef>
+        </p:style>
+      </p:cxnSp>
     </p:spTree>
     <p:extLst>
       <p:ext uri="{BB962C8B-B14F-4D97-AF65-F5344CB8AC3E}">
-        <p14:creationId xmlns:p14="http://schemas.microsoft.com/office/powerpoint/2010/main" val="161018379"/>
+        <p14:creationId xmlns:p14="http://schemas.microsoft.com/office/powerpoint/2010/main" val="524096363"/>
       </p:ext>
     </p:extLst>
   </p:cSld>

</xml_diff>